<commit_message>
Update user database and add new assets including PowerPoint template and images
</commit_message>
<xml_diff>
--- a/powerpoints/Reporte_plantilla_Altice.pptx
+++ b/powerpoints/Reporte_plantilla_Altice.pptx
@@ -13624,319 +13624,256 @@
           </a:p>
         </p:txBody>
       </p:sp>
-      <p:grpSp>
-        <p:nvGrpSpPr>
-          <p:cNvPr id="50" name="Group 49">
+      <p:pic>
+        <p:nvPicPr>
+          <p:cNvPr id="51" name="Graphic 50" descr="Eye with solid fill">
             <a:extLst>
               <a:ext uri="{FF2B5EF4-FFF2-40B4-BE49-F238E27FC236}">
-                <a16:creationId xmlns:a16="http://schemas.microsoft.com/office/drawing/2014/main" id="{B0425E07-D407-83AE-F4A4-D4935B974044}"/>
+                <a16:creationId xmlns:a16="http://schemas.microsoft.com/office/drawing/2014/main" id="{96AD7170-350D-5DFA-B7E1-DC2F66E4C741}"/>
               </a:ext>
             </a:extLst>
           </p:cNvPr>
-          <p:cNvGrpSpPr/>
+          <p:cNvPicPr>
+            <a:picLocks noChangeAspect="1"/>
+          </p:cNvPicPr>
           <p:nvPr/>
-        </p:nvGrpSpPr>
-        <p:grpSpPr>
+        </p:nvPicPr>
+        <p:blipFill>
+          <a:blip r:embed="rId3">
+            <a:extLst>
+              <a:ext uri="{28A0092B-C50C-407E-A947-70E740481C1C}">
+                <a14:useLocalDpi xmlns:a14="http://schemas.microsoft.com/office/drawing/2010/main" val="0"/>
+              </a:ext>
+              <a:ext uri="{96DAC541-7B7A-43D3-8B79-37D633B846F1}">
+                <asvg:svgBlip xmlns:asvg="http://schemas.microsoft.com/office/drawing/2016/SVG/main" r:embed="rId4"/>
+              </a:ext>
+            </a:extLst>
+          </a:blip>
+          <a:stretch>
+            <a:fillRect/>
+          </a:stretch>
+        </p:blipFill>
+        <p:spPr>
           <a:xfrm>
             <a:off x="19282333" y="528882"/>
-            <a:ext cx="2002108" cy="1086195"/>
-            <a:chOff x="17928404" y="2779423"/>
-            <a:chExt cx="2002108" cy="1086195"/>
+            <a:ext cx="808825" cy="787397"/>
           </a:xfrm>
-        </p:grpSpPr>
-        <p:pic>
-          <p:nvPicPr>
-            <p:cNvPr id="51" name="Graphic 50" descr="Eye with solid fill">
-              <a:extLst>
-                <a:ext uri="{FF2B5EF4-FFF2-40B4-BE49-F238E27FC236}">
-                  <a16:creationId xmlns:a16="http://schemas.microsoft.com/office/drawing/2014/main" id="{96AD7170-350D-5DFA-B7E1-DC2F66E4C741}"/>
-                </a:ext>
-              </a:extLst>
-            </p:cNvPr>
-            <p:cNvPicPr>
-              <a:picLocks noChangeAspect="1"/>
-            </p:cNvPicPr>
-            <p:nvPr/>
-          </p:nvPicPr>
-          <p:blipFill>
-            <a:blip r:embed="rId3">
-              <a:extLst>
-                <a:ext uri="{28A0092B-C50C-407E-A947-70E740481C1C}">
-                  <a14:useLocalDpi xmlns:a14="http://schemas.microsoft.com/office/drawing/2010/main" val="0"/>
-                </a:ext>
-                <a:ext uri="{96DAC541-7B7A-43D3-8B79-37D633B846F1}">
-                  <asvg:svgBlip xmlns:asvg="http://schemas.microsoft.com/office/drawing/2016/SVG/main" r:embed="rId4"/>
-                </a:ext>
-              </a:extLst>
-            </a:blip>
-            <a:stretch>
-              <a:fillRect/>
-            </a:stretch>
-          </p:blipFill>
-          <p:spPr>
-            <a:xfrm>
-              <a:off x="17928404" y="2779423"/>
-              <a:ext cx="808825" cy="787397"/>
-            </a:xfrm>
-            <a:prstGeom prst="rect">
-              <a:avLst/>
-            </a:prstGeom>
-          </p:spPr>
-        </p:pic>
-        <p:sp>
-          <p:nvSpPr>
-            <p:cNvPr id="52" name="TextBox 51">
-              <a:extLst>
-                <a:ext uri="{FF2B5EF4-FFF2-40B4-BE49-F238E27FC236}">
-                  <a16:creationId xmlns:a16="http://schemas.microsoft.com/office/drawing/2014/main" id="{90FBB62D-3443-24D6-65C2-CBC62489A9FF}"/>
-                </a:ext>
-              </a:extLst>
-            </p:cNvPr>
-            <p:cNvSpPr txBox="1"/>
-            <p:nvPr/>
-          </p:nvSpPr>
-          <p:spPr>
-            <a:xfrm>
-              <a:off x="18397720" y="2911511"/>
-              <a:ext cx="1532792" cy="954107"/>
-            </a:xfrm>
-            <a:prstGeom prst="rect">
-              <a:avLst/>
-            </a:prstGeom>
-            <a:noFill/>
-          </p:spPr>
-          <p:txBody>
-            <a:bodyPr wrap="square">
-              <a:spAutoFit/>
-            </a:bodyPr>
-            <a:lstStyle/>
-            <a:p>
-              <a:pPr algn="ctr"/>
-              <a:r>
-                <a:rPr lang="en-US" sz="2800" b="1" dirty="0">
-                  <a:solidFill>
-                    <a:schemeClr val="bg1"/>
-                  </a:solidFill>
-                  <a:latin typeface="Effra" panose="020B0603020203020204" pitchFamily="34" charset="0"/>
-                  <a:ea typeface="Open Sans" panose="020B0606030504020204" pitchFamily="34" charset="0"/>
-                  <a:cs typeface="Open Sans" panose="020B0606030504020204" pitchFamily="34" charset="0"/>
-                </a:rPr>
-                <a:t>EST_REACH</a:t>
-              </a:r>
-            </a:p>
-          </p:txBody>
-        </p:sp>
-      </p:grpSp>
-      <p:grpSp>
-        <p:nvGrpSpPr>
-          <p:cNvPr id="53" name="Group 52">
+          <a:prstGeom prst="rect">
+            <a:avLst/>
+          </a:prstGeom>
+        </p:spPr>
+      </p:pic>
+      <p:sp>
+        <p:nvSpPr>
+          <p:cNvPr id="52" name="TextBox 51">
             <a:extLst>
               <a:ext uri="{FF2B5EF4-FFF2-40B4-BE49-F238E27FC236}">
-                <a16:creationId xmlns:a16="http://schemas.microsoft.com/office/drawing/2014/main" id="{F2F0A3CF-3BC9-D7E4-D669-26AB8AB3C052}"/>
+                <a16:creationId xmlns:a16="http://schemas.microsoft.com/office/drawing/2014/main" id="{90FBB62D-3443-24D6-65C2-CBC62489A9FF}"/>
               </a:ext>
             </a:extLst>
           </p:cNvPr>
-          <p:cNvGrpSpPr/>
+          <p:cNvSpPr txBox="1"/>
           <p:nvPr/>
-        </p:nvGrpSpPr>
-        <p:grpSpPr>
+        </p:nvSpPr>
+        <p:spPr>
           <a:xfrm>
-            <a:off x="17086962" y="528882"/>
-            <a:ext cx="1743527" cy="3640741"/>
-            <a:chOff x="15419395" y="2839510"/>
-            <a:chExt cx="1743527" cy="3640741"/>
+            <a:off x="19751649" y="660970"/>
+            <a:ext cx="1532792" cy="954107"/>
           </a:xfrm>
-        </p:grpSpPr>
-        <p:pic>
-          <p:nvPicPr>
-            <p:cNvPr id="54" name="Graphic 53" descr="Children with solid fill">
-              <a:extLst>
-                <a:ext uri="{FF2B5EF4-FFF2-40B4-BE49-F238E27FC236}">
-                  <a16:creationId xmlns:a16="http://schemas.microsoft.com/office/drawing/2014/main" id="{538921FD-97C7-D86D-ED33-D859D08FCA22}"/>
-                </a:ext>
-              </a:extLst>
-            </p:cNvPr>
-            <p:cNvPicPr>
-              <a:picLocks noChangeAspect="1"/>
-            </p:cNvPicPr>
-            <p:nvPr/>
-          </p:nvPicPr>
-          <p:blipFill>
-            <a:blip r:embed="rId5">
-              <a:extLst>
-                <a:ext uri="{28A0092B-C50C-407E-A947-70E740481C1C}">
-                  <a14:useLocalDpi xmlns:a14="http://schemas.microsoft.com/office/drawing/2010/main" val="0"/>
-                </a:ext>
-                <a:ext uri="{96DAC541-7B7A-43D3-8B79-37D633B846F1}">
-                  <asvg:svgBlip xmlns:asvg="http://schemas.microsoft.com/office/drawing/2016/SVG/main" r:embed="rId6"/>
-                </a:ext>
-              </a:extLst>
-            </a:blip>
-            <a:stretch>
-              <a:fillRect/>
-            </a:stretch>
-          </p:blipFill>
-          <p:spPr>
-            <a:xfrm>
-              <a:off x="15419395" y="2839510"/>
-              <a:ext cx="787397" cy="787397"/>
-            </a:xfrm>
-            <a:prstGeom prst="rect">
-              <a:avLst/>
-            </a:prstGeom>
-          </p:spPr>
-        </p:pic>
-        <p:sp>
-          <p:nvSpPr>
-            <p:cNvPr id="55" name="TextBox 54">
-              <a:extLst>
-                <a:ext uri="{FF2B5EF4-FFF2-40B4-BE49-F238E27FC236}">
-                  <a16:creationId xmlns:a16="http://schemas.microsoft.com/office/drawing/2014/main" id="{62AC0EC3-3FFB-5184-C9C7-F6639C5CD84C}"/>
-                </a:ext>
-              </a:extLst>
-            </p:cNvPr>
-            <p:cNvSpPr txBox="1"/>
-            <p:nvPr/>
-          </p:nvSpPr>
-          <p:spPr>
-            <a:xfrm>
-              <a:off x="16246440" y="2940821"/>
-              <a:ext cx="916482" cy="3539430"/>
-            </a:xfrm>
-            <a:prstGeom prst="rect">
-              <a:avLst/>
-            </a:prstGeom>
-            <a:noFill/>
-          </p:spPr>
-          <p:txBody>
-            <a:bodyPr wrap="square">
-              <a:spAutoFit/>
-            </a:bodyPr>
-            <a:lstStyle/>
-            <a:p>
-              <a:r>
-                <a:rPr lang="en-US" sz="3200" b="1" dirty="0">
-                  <a:solidFill>
-                    <a:schemeClr val="bg1"/>
-                  </a:solidFill>
-                  <a:latin typeface="Effra" panose="020B0603020203020204" pitchFamily="34" charset="0"/>
-                  <a:ea typeface="Open Sans" panose="020B0606030504020204" pitchFamily="34" charset="0"/>
-                  <a:cs typeface="Open Sans" panose="020B0606030504020204" pitchFamily="34" charset="0"/>
-                </a:rPr>
-                <a:t>NUMB_ACTORS</a:t>
-              </a:r>
-            </a:p>
-            <a:p>
-              <a:endParaRPr lang="en-US" sz="3200" dirty="0">
+          <a:prstGeom prst="rect">
+            <a:avLst/>
+          </a:prstGeom>
+          <a:noFill/>
+        </p:spPr>
+        <p:txBody>
+          <a:bodyPr wrap="square">
+            <a:spAutoFit/>
+          </a:bodyPr>
+          <a:lstStyle/>
+          <a:p>
+            <a:pPr algn="ctr"/>
+            <a:r>
+              <a:rPr lang="en-US" sz="2800" b="1" dirty="0">
                 <a:solidFill>
                   <a:schemeClr val="bg1"/>
                 </a:solidFill>
                 <a:latin typeface="Effra" panose="020B0603020203020204" pitchFamily="34" charset="0"/>
-              </a:endParaRPr>
-            </a:p>
-          </p:txBody>
-        </p:sp>
-      </p:grpSp>
-      <p:grpSp>
-        <p:nvGrpSpPr>
-          <p:cNvPr id="56" name="Group 55">
+                <a:ea typeface="Open Sans" panose="020B0606030504020204" pitchFamily="34" charset="0"/>
+                <a:cs typeface="Open Sans" panose="020B0606030504020204" pitchFamily="34" charset="0"/>
+              </a:rPr>
+              <a:t>EST_REACH</a:t>
+            </a:r>
+          </a:p>
+        </p:txBody>
+      </p:sp>
+      <p:pic>
+        <p:nvPicPr>
+          <p:cNvPr id="54" name="Graphic 53" descr="Children with solid fill">
             <a:extLst>
               <a:ext uri="{FF2B5EF4-FFF2-40B4-BE49-F238E27FC236}">
-                <a16:creationId xmlns:a16="http://schemas.microsoft.com/office/drawing/2014/main" id="{8DA94A8D-90BF-3E84-7C1E-70DE05609ABB}"/>
+                <a16:creationId xmlns:a16="http://schemas.microsoft.com/office/drawing/2014/main" id="{538921FD-97C7-D86D-ED33-D859D08FCA22}"/>
               </a:ext>
             </a:extLst>
           </p:cNvPr>
-          <p:cNvGrpSpPr/>
+          <p:cNvPicPr>
+            <a:picLocks noChangeAspect="1"/>
+          </p:cNvPicPr>
           <p:nvPr/>
-        </p:nvGrpSpPr>
-        <p:grpSpPr>
+        </p:nvPicPr>
+        <p:blipFill>
+          <a:blip r:embed="rId5">
+            <a:extLst>
+              <a:ext uri="{28A0092B-C50C-407E-A947-70E740481C1C}">
+                <a14:useLocalDpi xmlns:a14="http://schemas.microsoft.com/office/drawing/2010/main" val="0"/>
+              </a:ext>
+              <a:ext uri="{96DAC541-7B7A-43D3-8B79-37D633B846F1}">
+                <asvg:svgBlip xmlns:asvg="http://schemas.microsoft.com/office/drawing/2016/SVG/main" r:embed="rId6"/>
+              </a:ext>
+            </a:extLst>
+          </a:blip>
+          <a:stretch>
+            <a:fillRect/>
+          </a:stretch>
+        </p:blipFill>
+        <p:spPr>
+          <a:xfrm>
+            <a:off x="17086962" y="528882"/>
+            <a:ext cx="787397" cy="787397"/>
+          </a:xfrm>
+          <a:prstGeom prst="rect">
+            <a:avLst/>
+          </a:prstGeom>
+        </p:spPr>
+      </p:pic>
+      <p:sp>
+        <p:nvSpPr>
+          <p:cNvPr id="55" name="TextBox 54">
+            <a:extLst>
+              <a:ext uri="{FF2B5EF4-FFF2-40B4-BE49-F238E27FC236}">
+                <a16:creationId xmlns:a16="http://schemas.microsoft.com/office/drawing/2014/main" id="{62AC0EC3-3FFB-5184-C9C7-F6639C5CD84C}"/>
+              </a:ext>
+            </a:extLst>
+          </p:cNvPr>
+          <p:cNvSpPr txBox="1"/>
+          <p:nvPr/>
+        </p:nvSpPr>
+        <p:spPr>
+          <a:xfrm>
+            <a:off x="17914007" y="630193"/>
+            <a:ext cx="916482" cy="3539430"/>
+          </a:xfrm>
+          <a:prstGeom prst="rect">
+            <a:avLst/>
+          </a:prstGeom>
+          <a:noFill/>
+        </p:spPr>
+        <p:txBody>
+          <a:bodyPr wrap="square">
+            <a:spAutoFit/>
+          </a:bodyPr>
+          <a:lstStyle/>
+          <a:p>
+            <a:r>
+              <a:rPr lang="en-US" sz="3200" b="1" dirty="0">
+                <a:solidFill>
+                  <a:schemeClr val="bg1"/>
+                </a:solidFill>
+                <a:latin typeface="Effra" panose="020B0603020203020204" pitchFamily="34" charset="0"/>
+                <a:ea typeface="Open Sans" panose="020B0606030504020204" pitchFamily="34" charset="0"/>
+                <a:cs typeface="Open Sans" panose="020B0606030504020204" pitchFamily="34" charset="0"/>
+              </a:rPr>
+              <a:t>NUMB_ACTORS</a:t>
+            </a:r>
+          </a:p>
+          <a:p>
+            <a:endParaRPr lang="en-US" sz="3200" dirty="0">
+              <a:solidFill>
+                <a:schemeClr val="bg1"/>
+              </a:solidFill>
+              <a:latin typeface="Effra" panose="020B0603020203020204" pitchFamily="34" charset="0"/>
+            </a:endParaRPr>
+          </a:p>
+        </p:txBody>
+      </p:sp>
+      <p:pic>
+        <p:nvPicPr>
+          <p:cNvPr id="57" name="Graphic 56" descr="Chat with solid fill">
+            <a:extLst>
+              <a:ext uri="{FF2B5EF4-FFF2-40B4-BE49-F238E27FC236}">
+                <a16:creationId xmlns:a16="http://schemas.microsoft.com/office/drawing/2014/main" id="{7B72716E-FD99-CA90-59AC-84C3E852C6C1}"/>
+              </a:ext>
+            </a:extLst>
+          </p:cNvPr>
+          <p:cNvPicPr>
+            <a:picLocks noChangeAspect="1"/>
+          </p:cNvPicPr>
+          <p:nvPr/>
+        </p:nvPicPr>
+        <p:blipFill>
+          <a:blip r:embed="rId7">
+            <a:extLst>
+              <a:ext uri="{28A0092B-C50C-407E-A947-70E740481C1C}">
+                <a14:useLocalDpi xmlns:a14="http://schemas.microsoft.com/office/drawing/2010/main" val="0"/>
+              </a:ext>
+              <a:ext uri="{96DAC541-7B7A-43D3-8B79-37D633B846F1}">
+                <asvg:svgBlip xmlns:asvg="http://schemas.microsoft.com/office/drawing/2016/SVG/main" r:embed="rId8"/>
+              </a:ext>
+            </a:extLst>
+          </a:blip>
+          <a:stretch>
+            <a:fillRect/>
+          </a:stretch>
+        </p:blipFill>
+        <p:spPr>
           <a:xfrm>
             <a:off x="14881973" y="606007"/>
-            <a:ext cx="1624445" cy="3071174"/>
-            <a:chOff x="13391514" y="2896182"/>
-            <a:chExt cx="1624445" cy="3071174"/>
+            <a:ext cx="633146" cy="633146"/>
           </a:xfrm>
-        </p:grpSpPr>
-        <p:pic>
-          <p:nvPicPr>
-            <p:cNvPr id="57" name="Graphic 56" descr="Chat with solid fill">
-              <a:extLst>
-                <a:ext uri="{FF2B5EF4-FFF2-40B4-BE49-F238E27FC236}">
-                  <a16:creationId xmlns:a16="http://schemas.microsoft.com/office/drawing/2014/main" id="{7B72716E-FD99-CA90-59AC-84C3E852C6C1}"/>
-                </a:ext>
-              </a:extLst>
-            </p:cNvPr>
-            <p:cNvPicPr>
-              <a:picLocks noChangeAspect="1"/>
-            </p:cNvPicPr>
-            <p:nvPr/>
-          </p:nvPicPr>
-          <p:blipFill>
-            <a:blip r:embed="rId7">
-              <a:extLst>
-                <a:ext uri="{28A0092B-C50C-407E-A947-70E740481C1C}">
-                  <a14:useLocalDpi xmlns:a14="http://schemas.microsoft.com/office/drawing/2010/main" val="0"/>
-                </a:ext>
-                <a:ext uri="{96DAC541-7B7A-43D3-8B79-37D633B846F1}">
-                  <asvg:svgBlip xmlns:asvg="http://schemas.microsoft.com/office/drawing/2016/SVG/main" r:embed="rId8"/>
-                </a:ext>
-              </a:extLst>
-            </a:blip>
-            <a:stretch>
-              <a:fillRect/>
-            </a:stretch>
-          </p:blipFill>
-          <p:spPr>
-            <a:xfrm>
-              <a:off x="13391514" y="2896182"/>
-              <a:ext cx="633146" cy="633146"/>
-            </a:xfrm>
-            <a:prstGeom prst="rect">
-              <a:avLst/>
-            </a:prstGeom>
-          </p:spPr>
-        </p:pic>
-        <p:sp>
-          <p:nvSpPr>
-            <p:cNvPr id="58" name="TextBox 57">
-              <a:extLst>
-                <a:ext uri="{FF2B5EF4-FFF2-40B4-BE49-F238E27FC236}">
-                  <a16:creationId xmlns:a16="http://schemas.microsoft.com/office/drawing/2014/main" id="{C9DA963F-A3A0-8C92-C4C3-C3816805AFBF}"/>
-                </a:ext>
-              </a:extLst>
-            </p:cNvPr>
-            <p:cNvSpPr txBox="1"/>
-            <p:nvPr/>
-          </p:nvSpPr>
-          <p:spPr>
-            <a:xfrm>
-              <a:off x="14024660" y="2920368"/>
-              <a:ext cx="991299" cy="3046988"/>
-            </a:xfrm>
-            <a:prstGeom prst="rect">
-              <a:avLst/>
-            </a:prstGeom>
-            <a:noFill/>
-          </p:spPr>
-          <p:txBody>
-            <a:bodyPr wrap="square">
-              <a:spAutoFit/>
-            </a:bodyPr>
-            <a:lstStyle/>
-            <a:p>
-              <a:r>
-                <a:rPr lang="en-US" sz="3200" b="1" dirty="0">
-                  <a:solidFill>
-                    <a:schemeClr val="bg1"/>
-                  </a:solidFill>
-                  <a:latin typeface="Effra" panose="020B0603020203020204" pitchFamily="34" charset="0"/>
-                </a:rPr>
-                <a:t>NUMB_MENTIONS</a:t>
-              </a:r>
-            </a:p>
-          </p:txBody>
-        </p:sp>
-      </p:grpSp>
+          <a:prstGeom prst="rect">
+            <a:avLst/>
+          </a:prstGeom>
+        </p:spPr>
+      </p:pic>
+      <p:sp>
+        <p:nvSpPr>
+          <p:cNvPr id="58" name="TextBox 57">
+            <a:extLst>
+              <a:ext uri="{FF2B5EF4-FFF2-40B4-BE49-F238E27FC236}">
+                <a16:creationId xmlns:a16="http://schemas.microsoft.com/office/drawing/2014/main" id="{C9DA963F-A3A0-8C92-C4C3-C3816805AFBF}"/>
+              </a:ext>
+            </a:extLst>
+          </p:cNvPr>
+          <p:cNvSpPr txBox="1"/>
+          <p:nvPr/>
+        </p:nvSpPr>
+        <p:spPr>
+          <a:xfrm>
+            <a:off x="15515119" y="630193"/>
+            <a:ext cx="1852139" cy="1569660"/>
+          </a:xfrm>
+          <a:prstGeom prst="rect">
+            <a:avLst/>
+          </a:prstGeom>
+          <a:noFill/>
+        </p:spPr>
+        <p:txBody>
+          <a:bodyPr wrap="square">
+            <a:spAutoFit/>
+          </a:bodyPr>
+          <a:lstStyle/>
+          <a:p>
+            <a:r>
+              <a:rPr lang="en-US" sz="3200" b="1" dirty="0">
+                <a:solidFill>
+                  <a:schemeClr val="bg1"/>
+                </a:solidFill>
+                <a:latin typeface="Effra" panose="020B0603020203020204" pitchFamily="34" charset="0"/>
+              </a:rPr>
+              <a:t>NUMB_MENTIONS</a:t>
+            </a:r>
+          </a:p>
+        </p:txBody>
+      </p:sp>
     </p:spTree>
     <p:extLst>
       <p:ext uri="{BB962C8B-B14F-4D97-AF65-F5344CB8AC3E}">
@@ -14047,7 +13984,7 @@
         <p:spPr>
           <a:xfrm>
             <a:off x="4859375" y="2897442"/>
-            <a:ext cx="11337740" cy="6247864"/>
+            <a:ext cx="11337740" cy="400110"/>
           </a:xfrm>
           <a:prstGeom prst="rect">
             <a:avLst/>
@@ -14069,19 +14006,38 @@
                 <a:latin typeface="Poppins" panose="00000500000000000000" pitchFamily="2" charset="0"/>
                 <a:cs typeface="Poppins" panose="00000500000000000000" pitchFamily="2" charset="0"/>
               </a:rPr>
-              <a:t>La conversación en redes sociales sobre Altice en la última semana ha estado dominada por comentarios de clientes que expresan insatisfacción con la calidad del servicio, especialmente en lo referente a la velocidad e intermitencia del internet, así como dificultades en la atención al cliente. </a:t>
+              <a:t>CONVERSATION_ANALISIS</a:t>
             </a:r>
           </a:p>
-          <a:p>
-            <a:pPr algn="just"/>
-            <a:endParaRPr lang="es-ES" sz="2000" dirty="0">
-              <a:solidFill>
-                <a:schemeClr val="bg1"/>
-              </a:solidFill>
-              <a:latin typeface="Poppins" panose="00000500000000000000" pitchFamily="2" charset="0"/>
-              <a:cs typeface="Poppins" panose="00000500000000000000" pitchFamily="2" charset="0"/>
-            </a:endParaRPr>
-          </a:p>
+        </p:txBody>
+      </p:sp>
+      <p:sp>
+        <p:nvSpPr>
+          <p:cNvPr id="3" name="TextBox 2">
+            <a:extLst>
+              <a:ext uri="{FF2B5EF4-FFF2-40B4-BE49-F238E27FC236}">
+                <a16:creationId xmlns:a16="http://schemas.microsoft.com/office/drawing/2014/main" id="{344FB2FC-369B-6757-02FF-18B4C0EC1B4A}"/>
+              </a:ext>
+            </a:extLst>
+          </p:cNvPr>
+          <p:cNvSpPr txBox="1"/>
+          <p:nvPr/>
+        </p:nvSpPr>
+        <p:spPr>
+          <a:xfrm>
+            <a:off x="4859375" y="4099709"/>
+            <a:ext cx="11337740" cy="400110"/>
+          </a:xfrm>
+          <a:prstGeom prst="rect">
+            <a:avLst/>
+          </a:prstGeom>
+          <a:noFill/>
+        </p:spPr>
+        <p:txBody>
+          <a:bodyPr wrap="square">
+            <a:spAutoFit/>
+          </a:bodyPr>
+          <a:lstStyle/>
           <a:p>
             <a:pPr algn="just"/>
             <a:r>
@@ -14092,50 +14048,7 @@
                 <a:latin typeface="Poppins" panose="00000500000000000000" pitchFamily="2" charset="0"/>
                 <a:cs typeface="Poppins" panose="00000500000000000000" pitchFamily="2" charset="0"/>
               </a:rPr>
-              <a:t>Muchos usuarios han manifestado molestias por el sistema de “</a:t>
-            </a:r>
-            <a:r>
-              <a:rPr lang="es-ES" sz="2000" dirty="0" err="1">
-                <a:solidFill>
-                  <a:schemeClr val="bg1"/>
-                </a:solidFill>
-                <a:latin typeface="Poppins" panose="00000500000000000000" pitchFamily="2" charset="0"/>
-                <a:cs typeface="Poppins" panose="00000500000000000000" pitchFamily="2" charset="0"/>
-              </a:rPr>
-              <a:t>fidepuntos</a:t>
-            </a:r>
-            <a:r>
-              <a:rPr lang="es-ES" sz="2000" dirty="0">
-                <a:solidFill>
-                  <a:schemeClr val="bg1"/>
-                </a:solidFill>
-                <a:latin typeface="Poppins" panose="00000500000000000000" pitchFamily="2" charset="0"/>
-                <a:cs typeface="Poppins" panose="00000500000000000000" pitchFamily="2" charset="0"/>
-              </a:rPr>
-              <a:t>”, señalando que reciben múltiples llamadas promocionales y que el proceso de renovación suele implicar la extensión automática de sus contratos, lo que genera frustración y desconfianza. Además, se observan comparaciones frecuentes con otros proveedores, generalmente en tono crítico hacia Altice, y quejas sobre la dificultad para cancelar servicios o resolver problemas técnicos.</a:t>
-            </a:r>
-          </a:p>
-          <a:p>
-            <a:pPr algn="just"/>
-            <a:endParaRPr lang="es-ES" sz="2000" dirty="0">
-              <a:solidFill>
-                <a:schemeClr val="bg1"/>
-              </a:solidFill>
-              <a:latin typeface="Poppins" panose="00000500000000000000" pitchFamily="2" charset="0"/>
-              <a:cs typeface="Poppins" panose="00000500000000000000" pitchFamily="2" charset="0"/>
-            </a:endParaRPr>
-          </a:p>
-          <a:p>
-            <a:pPr algn="just"/>
-            <a:r>
-              <a:rPr lang="es-ES" sz="2000" dirty="0">
-                <a:solidFill>
-                  <a:schemeClr val="bg1"/>
-                </a:solidFill>
-                <a:latin typeface="Poppins" panose="00000500000000000000" pitchFamily="2" charset="0"/>
-                <a:cs typeface="Poppins" panose="00000500000000000000" pitchFamily="2" charset="0"/>
-              </a:rPr>
-              <a:t>También hay espacio para menciones positivas, principalmente relacionadas con iniciativas de responsabilidad social y promociones. Un ejemplo destacado es la realización de la primera función de cine sostenible organizada por Altice, que fue bien recibida por algunos clientes y medios. Las cuentas oficiales de Altice, como @altice_do y @SomosAlticeDo, participan activamente en la conversación, respondiendo a inquietudes y promoviendo ofertas, aunque la percepción general sigue siendo de oportunidad de mejora en la experiencia del cliente y la transparencia en los procesos comerciales.</a:t>
+              <a:t>TOP_NEWS</a:t>
             </a:r>
           </a:p>
         </p:txBody>
@@ -16939,7 +16852,10 @@
           <a:lstStyle/>
           <a:p>
             <a:pPr algn="ctr"/>
-            <a:endParaRPr lang="en-US" b="1"/>
+            <a:r>
+              <a:rPr lang="en-US" b="1" dirty="0"/>
+              <a:t>WORDCLOUD</a:t>
+            </a:r>
           </a:p>
         </p:txBody>
       </p:sp>

</xml_diff>

<commit_message>
Refactor PowerPoint report generation to improve placeholder handling and remove unused assets
</commit_message>
<xml_diff>
--- a/powerpoints/Reporte_plantilla_Altice.pptx
+++ b/powerpoints/Reporte_plantilla_Altice.pptx
@@ -13874,6 +13874,54 @@
           </a:p>
         </p:txBody>
       </p:sp>
+      <p:sp>
+        <p:nvSpPr>
+          <p:cNvPr id="3" name="TextBox 2">
+            <a:extLst>
+              <a:ext uri="{FF2B5EF4-FFF2-40B4-BE49-F238E27FC236}">
+                <a16:creationId xmlns:a16="http://schemas.microsoft.com/office/drawing/2014/main" id="{DF91231A-ED7C-E5F5-8BD2-8D6FFB1B7776}"/>
+              </a:ext>
+            </a:extLst>
+          </p:cNvPr>
+          <p:cNvSpPr txBox="1"/>
+          <p:nvPr/>
+        </p:nvSpPr>
+        <p:spPr>
+          <a:xfrm>
+            <a:off x="3588406" y="4319935"/>
+            <a:ext cx="9043859" cy="584775"/>
+          </a:xfrm>
+          <a:prstGeom prst="rect">
+            <a:avLst/>
+          </a:prstGeom>
+          <a:noFill/>
+        </p:spPr>
+        <p:txBody>
+          <a:bodyPr wrap="square">
+            <a:spAutoFit/>
+          </a:bodyPr>
+          <a:lstStyle/>
+          <a:p>
+            <a:r>
+              <a:rPr lang="en-US" sz="3200" b="1" dirty="0">
+                <a:solidFill>
+                  <a:schemeClr val="bg1"/>
+                </a:solidFill>
+                <a:latin typeface="Effra" panose="020B0603020203020204" pitchFamily="34" charset="0"/>
+                <a:ea typeface="Open Sans" panose="020B0606030504020204" pitchFamily="34" charset="0"/>
+                <a:cs typeface="Open Sans" panose="020B0606030504020204" pitchFamily="34" charset="0"/>
+              </a:rPr>
+              <a:t>CONVERSATION_CHART</a:t>
+            </a:r>
+            <a:endParaRPr lang="en-US" sz="3200" dirty="0">
+              <a:solidFill>
+                <a:schemeClr val="bg1"/>
+              </a:solidFill>
+              <a:latin typeface="Effra" panose="020B0603020203020204" pitchFamily="34" charset="0"/>
+            </a:endParaRPr>
+          </a:p>
+        </p:txBody>
+      </p:sp>
     </p:spTree>
     <p:extLst>
       <p:ext uri="{BB962C8B-B14F-4D97-AF65-F5344CB8AC3E}">
@@ -14425,7 +14473,7 @@
           <p:nvPr>
             <p:extLst>
               <p:ext uri="{D42A27DB-BD31-4B8C-83A1-F6EECF244321}">
-                <p14:modId xmlns:p14="http://schemas.microsoft.com/office/powerpoint/2010/main" val="2948672455"/>
+                <p14:modId xmlns:p14="http://schemas.microsoft.com/office/powerpoint/2010/main" val="1394284545"/>
               </p:ext>
             </p:extLst>
           </p:nvPr>
@@ -14620,105 +14668,6 @@
                       <a:pPr algn="ctr" fontAlgn="b">
                         <a:buNone/>
                       </a:pPr>
-                      <a:r>
-                        <a:rPr lang="en-US" sz="1600" b="0" i="0" u="none" strike="noStrike" dirty="0">
-                          <a:solidFill>
-                            <a:srgbClr val="000000"/>
-                          </a:solidFill>
-                          <a:effectLst/>
-                          <a:latin typeface="Poppins" panose="00000500000000000000" pitchFamily="2" charset="0"/>
-                          <a:cs typeface="Poppins" panose="00000500000000000000" pitchFamily="2" charset="0"/>
-                        </a:rPr>
-                        <a:t>Trading View</a:t>
-                      </a:r>
-                    </a:p>
-                  </a:txBody>
-                  <a:tcPr marL="9525" marR="9525" marT="9525" marB="0" anchor="ctr">
-                    <a:solidFill>
-                      <a:schemeClr val="bg1"/>
-                    </a:solidFill>
-                  </a:tcPr>
-                </a:tc>
-                <a:tc>
-                  <a:txBody>
-                    <a:bodyPr/>
-                    <a:lstStyle/>
-                    <a:p>
-                      <a:pPr algn="ctr" fontAlgn="b">
-                        <a:buNone/>
-                      </a:pPr>
-                      <a:r>
-                        <a:rPr lang="en-US" sz="1600" b="0" i="0" u="none" strike="noStrike" dirty="0">
-                          <a:solidFill>
-                            <a:srgbClr val="000000"/>
-                          </a:solidFill>
-                          <a:effectLst/>
-                          <a:latin typeface="Poppins" panose="00000500000000000000" pitchFamily="2" charset="0"/>
-                          <a:cs typeface="Poppins" panose="00000500000000000000" pitchFamily="2" charset="0"/>
-                        </a:rPr>
-                        <a:t>27,223,921 </a:t>
-                      </a:r>
-                    </a:p>
-                  </a:txBody>
-                  <a:tcPr marL="9525" marR="9525" marT="9525" marB="0" anchor="ctr">
-                    <a:solidFill>
-                      <a:schemeClr val="bg1"/>
-                    </a:solidFill>
-                  </a:tcPr>
-                </a:tc>
-                <a:tc>
-                  <a:txBody>
-                    <a:bodyPr/>
-                    <a:lstStyle/>
-                    <a:p>
-                      <a:pPr algn="ctr" fontAlgn="b">
-                        <a:buNone/>
-                      </a:pPr>
-                      <a:r>
-                        <a:rPr lang="en-US" sz="1600" b="0" i="0" u="none" strike="noStrike">
-                          <a:solidFill>
-                            <a:srgbClr val="000000"/>
-                          </a:solidFill>
-                          <a:effectLst/>
-                          <a:latin typeface="Poppins" panose="00000500000000000000" pitchFamily="2" charset="0"/>
-                          <a:cs typeface="Poppins" panose="00000500000000000000" pitchFamily="2" charset="0"/>
-                        </a:rPr>
-                        <a:t>1</a:t>
-                      </a:r>
-                    </a:p>
-                  </a:txBody>
-                  <a:tcPr marL="9525" marR="9525" marT="9525" marB="0" anchor="ctr">
-                    <a:solidFill>
-                      <a:schemeClr val="bg1"/>
-                    </a:solidFill>
-                  </a:tcPr>
-                </a:tc>
-                <a:extLst>
-                  <a:ext uri="{0D108BD9-81ED-4DB2-BD59-A6C34878D82A}">
-                    <a16:rowId xmlns:a16="http://schemas.microsoft.com/office/drawing/2014/main" val="3130163703"/>
-                  </a:ext>
-                </a:extLst>
-              </a:tr>
-              <a:tr h="365760">
-                <a:tc>
-                  <a:txBody>
-                    <a:bodyPr/>
-                    <a:lstStyle/>
-                    <a:p>
-                      <a:pPr algn="ctr" fontAlgn="b">
-                        <a:buNone/>
-                      </a:pPr>
-                      <a:r>
-                        <a:rPr lang="en-US" sz="1600" b="0" i="0" u="none" strike="noStrike" dirty="0" err="1">
-                          <a:solidFill>
-                            <a:srgbClr val="000000"/>
-                          </a:solidFill>
-                          <a:effectLst/>
-                          <a:latin typeface="Poppins" panose="00000500000000000000" pitchFamily="2" charset="0"/>
-                          <a:cs typeface="Poppins" panose="00000500000000000000" pitchFamily="2" charset="0"/>
-                        </a:rPr>
-                        <a:t>robertocavada</a:t>
-                      </a:r>
                       <a:endParaRPr lang="en-US" sz="1600" b="0" i="0" u="none" strike="noStrike" dirty="0">
                         <a:solidFill>
                           <a:srgbClr val="000000"/>
@@ -14743,17 +14692,14 @@
                       <a:pPr algn="ctr" fontAlgn="b">
                         <a:buNone/>
                       </a:pPr>
-                      <a:r>
-                        <a:rPr lang="en-US" sz="1600" b="0" i="0" u="none" strike="noStrike" dirty="0">
-                          <a:solidFill>
-                            <a:srgbClr val="000000"/>
-                          </a:solidFill>
-                          <a:effectLst/>
-                          <a:latin typeface="Poppins" panose="00000500000000000000" pitchFamily="2" charset="0"/>
-                          <a:cs typeface="Poppins" panose="00000500000000000000" pitchFamily="2" charset="0"/>
-                        </a:rPr>
-                        <a:t>1,810,337 </a:t>
-                      </a:r>
+                      <a:endParaRPr lang="en-US" sz="1600" b="0" i="0" u="none" strike="noStrike" dirty="0">
+                        <a:solidFill>
+                          <a:srgbClr val="000000"/>
+                        </a:solidFill>
+                        <a:effectLst/>
+                        <a:latin typeface="Poppins" panose="00000500000000000000" pitchFamily="2" charset="0"/>
+                        <a:cs typeface="Poppins" panose="00000500000000000000" pitchFamily="2" charset="0"/>
+                      </a:endParaRPr>
                     </a:p>
                   </a:txBody>
                   <a:tcPr marL="9525" marR="9525" marT="9525" marB="0" anchor="ctr">
@@ -14770,17 +14716,93 @@
                       <a:pPr algn="ctr" fontAlgn="b">
                         <a:buNone/>
                       </a:pPr>
-                      <a:r>
-                        <a:rPr lang="en-US" sz="1600" b="0" i="0" u="none" strike="noStrike">
-                          <a:solidFill>
-                            <a:srgbClr val="000000"/>
-                          </a:solidFill>
-                          <a:effectLst/>
-                          <a:latin typeface="Poppins" panose="00000500000000000000" pitchFamily="2" charset="0"/>
-                          <a:cs typeface="Poppins" panose="00000500000000000000" pitchFamily="2" charset="0"/>
-                        </a:rPr>
-                        <a:t>1</a:t>
-                      </a:r>
+                      <a:endParaRPr lang="en-US" sz="1600" b="0" i="0" u="none" strike="noStrike">
+                        <a:solidFill>
+                          <a:srgbClr val="000000"/>
+                        </a:solidFill>
+                        <a:effectLst/>
+                        <a:latin typeface="Poppins" panose="00000500000000000000" pitchFamily="2" charset="0"/>
+                        <a:cs typeface="Poppins" panose="00000500000000000000" pitchFamily="2" charset="0"/>
+                      </a:endParaRPr>
+                    </a:p>
+                  </a:txBody>
+                  <a:tcPr marL="9525" marR="9525" marT="9525" marB="0" anchor="ctr">
+                    <a:solidFill>
+                      <a:schemeClr val="bg1"/>
+                    </a:solidFill>
+                  </a:tcPr>
+                </a:tc>
+                <a:extLst>
+                  <a:ext uri="{0D108BD9-81ED-4DB2-BD59-A6C34878D82A}">
+                    <a16:rowId xmlns:a16="http://schemas.microsoft.com/office/drawing/2014/main" val="3130163703"/>
+                  </a:ext>
+                </a:extLst>
+              </a:tr>
+              <a:tr h="365760">
+                <a:tc>
+                  <a:txBody>
+                    <a:bodyPr/>
+                    <a:lstStyle/>
+                    <a:p>
+                      <a:pPr algn="ctr" fontAlgn="b">
+                        <a:buNone/>
+                      </a:pPr>
+                      <a:endParaRPr lang="en-US" sz="1600" b="0" i="0" u="none" strike="noStrike" dirty="0">
+                        <a:solidFill>
+                          <a:srgbClr val="000000"/>
+                        </a:solidFill>
+                        <a:effectLst/>
+                        <a:latin typeface="Poppins" panose="00000500000000000000" pitchFamily="2" charset="0"/>
+                        <a:cs typeface="Poppins" panose="00000500000000000000" pitchFamily="2" charset="0"/>
+                      </a:endParaRPr>
+                    </a:p>
+                  </a:txBody>
+                  <a:tcPr marL="9525" marR="9525" marT="9525" marB="0" anchor="ctr">
+                    <a:solidFill>
+                      <a:schemeClr val="bg1"/>
+                    </a:solidFill>
+                  </a:tcPr>
+                </a:tc>
+                <a:tc>
+                  <a:txBody>
+                    <a:bodyPr/>
+                    <a:lstStyle/>
+                    <a:p>
+                      <a:pPr algn="ctr" fontAlgn="b">
+                        <a:buNone/>
+                      </a:pPr>
+                      <a:endParaRPr lang="en-US" sz="1600" b="0" i="0" u="none" strike="noStrike" dirty="0">
+                        <a:solidFill>
+                          <a:srgbClr val="000000"/>
+                        </a:solidFill>
+                        <a:effectLst/>
+                        <a:latin typeface="Poppins" panose="00000500000000000000" pitchFamily="2" charset="0"/>
+                        <a:cs typeface="Poppins" panose="00000500000000000000" pitchFamily="2" charset="0"/>
+                      </a:endParaRPr>
+                    </a:p>
+                  </a:txBody>
+                  <a:tcPr marL="9525" marR="9525" marT="9525" marB="0" anchor="ctr">
+                    <a:solidFill>
+                      <a:schemeClr val="bg1"/>
+                    </a:solidFill>
+                  </a:tcPr>
+                </a:tc>
+                <a:tc>
+                  <a:txBody>
+                    <a:bodyPr/>
+                    <a:lstStyle/>
+                    <a:p>
+                      <a:pPr algn="ctr" fontAlgn="b">
+                        <a:buNone/>
+                      </a:pPr>
+                      <a:endParaRPr lang="en-US" sz="1600" b="0" i="0" u="none" strike="noStrike">
+                        <a:solidFill>
+                          <a:srgbClr val="000000"/>
+                        </a:solidFill>
+                        <a:effectLst/>
+                        <a:latin typeface="Poppins" panose="00000500000000000000" pitchFamily="2" charset="0"/>
+                        <a:cs typeface="Poppins" panose="00000500000000000000" pitchFamily="2" charset="0"/>
+                      </a:endParaRPr>
                     </a:p>
                   </a:txBody>
                   <a:tcPr marL="9525" marR="9525" marT="9525" marB="0" anchor="ctr">
@@ -14804,17 +14826,14 @@
                       <a:pPr algn="ctr" fontAlgn="b">
                         <a:buNone/>
                       </a:pPr>
-                      <a:r>
-                        <a:rPr lang="en-US" sz="1600" b="0" i="0" u="none" strike="noStrike">
-                          <a:solidFill>
-                            <a:srgbClr val="000000"/>
-                          </a:solidFill>
-                          <a:effectLst/>
-                          <a:latin typeface="Poppins" panose="00000500000000000000" pitchFamily="2" charset="0"/>
-                          <a:cs typeface="Poppins" panose="00000500000000000000" pitchFamily="2" charset="0"/>
-                        </a:rPr>
-                        <a:t>@altice_do</a:t>
-                      </a:r>
+                      <a:endParaRPr lang="en-US" sz="1600" b="0" i="0" u="none" strike="noStrike">
+                        <a:solidFill>
+                          <a:srgbClr val="000000"/>
+                        </a:solidFill>
+                        <a:effectLst/>
+                        <a:latin typeface="Poppins" panose="00000500000000000000" pitchFamily="2" charset="0"/>
+                        <a:cs typeface="Poppins" panose="00000500000000000000" pitchFamily="2" charset="0"/>
+                      </a:endParaRPr>
                     </a:p>
                   </a:txBody>
                   <a:tcPr marL="9525" marR="9525" marT="9525" marB="0" anchor="ctr">
@@ -14831,17 +14850,14 @@
                       <a:pPr algn="ctr" fontAlgn="b">
                         <a:buNone/>
                       </a:pPr>
-                      <a:r>
-                        <a:rPr lang="en-US" sz="1600" b="0" i="0" u="none" strike="noStrike" dirty="0">
-                          <a:solidFill>
-                            <a:srgbClr val="000000"/>
-                          </a:solidFill>
-                          <a:effectLst/>
-                          <a:latin typeface="Poppins" panose="00000500000000000000" pitchFamily="2" charset="0"/>
-                          <a:cs typeface="Poppins" panose="00000500000000000000" pitchFamily="2" charset="0"/>
-                        </a:rPr>
-                        <a:t>397,036 </a:t>
-                      </a:r>
+                      <a:endParaRPr lang="en-US" sz="1600" b="0" i="0" u="none" strike="noStrike" dirty="0">
+                        <a:solidFill>
+                          <a:srgbClr val="000000"/>
+                        </a:solidFill>
+                        <a:effectLst/>
+                        <a:latin typeface="Poppins" panose="00000500000000000000" pitchFamily="2" charset="0"/>
+                        <a:cs typeface="Poppins" panose="00000500000000000000" pitchFamily="2" charset="0"/>
+                      </a:endParaRPr>
                     </a:p>
                   </a:txBody>
                   <a:tcPr marL="9525" marR="9525" marT="9525" marB="0" anchor="ctr">
@@ -14858,17 +14874,14 @@
                       <a:pPr algn="ctr" fontAlgn="b">
                         <a:buNone/>
                       </a:pPr>
-                      <a:r>
-                        <a:rPr lang="en-US" sz="1600" b="0" i="0" u="none" strike="noStrike">
-                          <a:solidFill>
-                            <a:srgbClr val="000000"/>
-                          </a:solidFill>
-                          <a:effectLst/>
-                          <a:latin typeface="Poppins" panose="00000500000000000000" pitchFamily="2" charset="0"/>
-                          <a:cs typeface="Poppins" panose="00000500000000000000" pitchFamily="2" charset="0"/>
-                        </a:rPr>
-                        <a:t>2</a:t>
-                      </a:r>
+                      <a:endParaRPr lang="en-US" sz="1600" b="0" i="0" u="none" strike="noStrike">
+                        <a:solidFill>
+                          <a:srgbClr val="000000"/>
+                        </a:solidFill>
+                        <a:effectLst/>
+                        <a:latin typeface="Poppins" panose="00000500000000000000" pitchFamily="2" charset="0"/>
+                        <a:cs typeface="Poppins" panose="00000500000000000000" pitchFamily="2" charset="0"/>
+                      </a:endParaRPr>
                     </a:p>
                   </a:txBody>
                   <a:tcPr marL="9525" marR="9525" marT="9525" marB="0" anchor="ctr">
@@ -14892,17 +14905,14 @@
                       <a:pPr algn="ctr" fontAlgn="b">
                         <a:buNone/>
                       </a:pPr>
-                      <a:r>
-                        <a:rPr lang="en-US" sz="1600" b="0" i="0" u="none" strike="noStrike">
-                          <a:solidFill>
-                            <a:srgbClr val="000000"/>
-                          </a:solidFill>
-                          <a:effectLst/>
-                          <a:latin typeface="Poppins" panose="00000500000000000000" pitchFamily="2" charset="0"/>
-                          <a:cs typeface="Poppins" panose="00000500000000000000" pitchFamily="2" charset="0"/>
-                        </a:rPr>
-                        <a:t>@digesettrd_</a:t>
-                      </a:r>
+                      <a:endParaRPr lang="en-US" sz="1600" b="0" i="0" u="none" strike="noStrike">
+                        <a:solidFill>
+                          <a:srgbClr val="000000"/>
+                        </a:solidFill>
+                        <a:effectLst/>
+                        <a:latin typeface="Poppins" panose="00000500000000000000" pitchFamily="2" charset="0"/>
+                        <a:cs typeface="Poppins" panose="00000500000000000000" pitchFamily="2" charset="0"/>
+                      </a:endParaRPr>
                     </a:p>
                   </a:txBody>
                   <a:tcPr marL="9525" marR="9525" marT="9525" marB="0" anchor="ctr">
@@ -14919,17 +14929,14 @@
                       <a:pPr algn="ctr" fontAlgn="b">
                         <a:buNone/>
                       </a:pPr>
-                      <a:r>
-                        <a:rPr lang="en-US" sz="1600" b="0" i="0" u="none" strike="noStrike" dirty="0">
-                          <a:solidFill>
-                            <a:srgbClr val="000000"/>
-                          </a:solidFill>
-                          <a:effectLst/>
-                          <a:latin typeface="Poppins" panose="00000500000000000000" pitchFamily="2" charset="0"/>
-                          <a:cs typeface="Poppins" panose="00000500000000000000" pitchFamily="2" charset="0"/>
-                        </a:rPr>
-                        <a:t>243,561 </a:t>
-                      </a:r>
+                      <a:endParaRPr lang="en-US" sz="1600" b="0" i="0" u="none" strike="noStrike" dirty="0">
+                        <a:solidFill>
+                          <a:srgbClr val="000000"/>
+                        </a:solidFill>
+                        <a:effectLst/>
+                        <a:latin typeface="Poppins" panose="00000500000000000000" pitchFamily="2" charset="0"/>
+                        <a:cs typeface="Poppins" panose="00000500000000000000" pitchFamily="2" charset="0"/>
+                      </a:endParaRPr>
                     </a:p>
                   </a:txBody>
                   <a:tcPr marL="9525" marR="9525" marT="9525" marB="0" anchor="ctr">
@@ -14946,17 +14953,14 @@
                       <a:pPr algn="ctr" fontAlgn="b">
                         <a:buNone/>
                       </a:pPr>
-                      <a:r>
-                        <a:rPr lang="en-US" sz="1600" b="0" i="0" u="none" strike="noStrike" dirty="0">
-                          <a:solidFill>
-                            <a:srgbClr val="000000"/>
-                          </a:solidFill>
-                          <a:effectLst/>
-                          <a:latin typeface="Poppins" panose="00000500000000000000" pitchFamily="2" charset="0"/>
-                          <a:cs typeface="Poppins" panose="00000500000000000000" pitchFamily="2" charset="0"/>
-                        </a:rPr>
-                        <a:t>1</a:t>
-                      </a:r>
+                      <a:endParaRPr lang="en-US" sz="1600" b="0" i="0" u="none" strike="noStrike" dirty="0">
+                        <a:solidFill>
+                          <a:srgbClr val="000000"/>
+                        </a:solidFill>
+                        <a:effectLst/>
+                        <a:latin typeface="Poppins" panose="00000500000000000000" pitchFamily="2" charset="0"/>
+                        <a:cs typeface="Poppins" panose="00000500000000000000" pitchFamily="2" charset="0"/>
+                      </a:endParaRPr>
                     </a:p>
                   </a:txBody>
                   <a:tcPr marL="9525" marR="9525" marT="9525" marB="0" anchor="ctr">
@@ -14980,17 +14984,14 @@
                       <a:pPr algn="ctr" fontAlgn="b">
                         <a:buNone/>
                       </a:pPr>
-                      <a:r>
-                        <a:rPr lang="en-US" sz="1600" b="0" i="0" u="none" strike="noStrike">
-                          <a:solidFill>
-                            <a:srgbClr val="000000"/>
-                          </a:solidFill>
-                          <a:effectLst/>
-                          <a:latin typeface="Poppins" panose="00000500000000000000" pitchFamily="2" charset="0"/>
-                          <a:cs typeface="Poppins" panose="00000500000000000000" pitchFamily="2" charset="0"/>
-                        </a:rPr>
-                        <a:t>@arreazaortega</a:t>
-                      </a:r>
+                      <a:endParaRPr lang="en-US" sz="1600" b="0" i="0" u="none" strike="noStrike">
+                        <a:solidFill>
+                          <a:srgbClr val="000000"/>
+                        </a:solidFill>
+                        <a:effectLst/>
+                        <a:latin typeface="Poppins" panose="00000500000000000000" pitchFamily="2" charset="0"/>
+                        <a:cs typeface="Poppins" panose="00000500000000000000" pitchFamily="2" charset="0"/>
+                      </a:endParaRPr>
                     </a:p>
                   </a:txBody>
                   <a:tcPr marL="9525" marR="9525" marT="9525" marB="0" anchor="ctr">
@@ -15007,17 +15008,14 @@
                       <a:pPr algn="ctr" fontAlgn="b">
                         <a:buNone/>
                       </a:pPr>
-                      <a:r>
-                        <a:rPr lang="en-US" sz="1600" b="0" i="0" u="none" strike="noStrike" dirty="0">
-                          <a:solidFill>
-                            <a:srgbClr val="000000"/>
-                          </a:solidFill>
-                          <a:effectLst/>
-                          <a:latin typeface="Poppins" panose="00000500000000000000" pitchFamily="2" charset="0"/>
-                          <a:cs typeface="Poppins" panose="00000500000000000000" pitchFamily="2" charset="0"/>
-                        </a:rPr>
-                        <a:t>211,055 </a:t>
-                      </a:r>
+                      <a:endParaRPr lang="en-US" sz="1600" b="0" i="0" u="none" strike="noStrike" dirty="0">
+                        <a:solidFill>
+                          <a:srgbClr val="000000"/>
+                        </a:solidFill>
+                        <a:effectLst/>
+                        <a:latin typeface="Poppins" panose="00000500000000000000" pitchFamily="2" charset="0"/>
+                        <a:cs typeface="Poppins" panose="00000500000000000000" pitchFamily="2" charset="0"/>
+                      </a:endParaRPr>
                     </a:p>
                   </a:txBody>
                   <a:tcPr marL="9525" marR="9525" marT="9525" marB="0" anchor="ctr">
@@ -15034,17 +15032,14 @@
                       <a:pPr algn="ctr" fontAlgn="b">
                         <a:buNone/>
                       </a:pPr>
-                      <a:r>
-                        <a:rPr lang="en-US" sz="1600" b="0" i="0" u="none" strike="noStrike" dirty="0">
-                          <a:solidFill>
-                            <a:srgbClr val="000000"/>
-                          </a:solidFill>
-                          <a:effectLst/>
-                          <a:latin typeface="Poppins" panose="00000500000000000000" pitchFamily="2" charset="0"/>
-                          <a:cs typeface="Poppins" panose="00000500000000000000" pitchFamily="2" charset="0"/>
-                        </a:rPr>
-                        <a:t>4</a:t>
-                      </a:r>
+                      <a:endParaRPr lang="en-US" sz="1600" b="0" i="0" u="none" strike="noStrike" dirty="0">
+                        <a:solidFill>
+                          <a:srgbClr val="000000"/>
+                        </a:solidFill>
+                        <a:effectLst/>
+                        <a:latin typeface="Poppins" panose="00000500000000000000" pitchFamily="2" charset="0"/>
+                        <a:cs typeface="Poppins" panose="00000500000000000000" pitchFamily="2" charset="0"/>
+                      </a:endParaRPr>
                     </a:p>
                   </a:txBody>
                   <a:tcPr marL="9525" marR="9525" marT="9525" marB="0" anchor="ctr">
@@ -15078,7 +15073,7 @@
           <p:nvPr>
             <p:extLst>
               <p:ext uri="{D42A27DB-BD31-4B8C-83A1-F6EECF244321}">
-                <p14:modId xmlns:p14="http://schemas.microsoft.com/office/powerpoint/2010/main" val="2244357756"/>
+                <p14:modId xmlns:p14="http://schemas.microsoft.com/office/powerpoint/2010/main" val="1538538363"/>
               </p:ext>
             </p:extLst>
           </p:nvPr>
@@ -15264,17 +15259,14 @@
                       <a:pPr algn="ctr" fontAlgn="b">
                         <a:buNone/>
                       </a:pPr>
-                      <a:r>
-                        <a:rPr lang="en-US" sz="1600" b="0" i="0" u="none" strike="noStrike">
-                          <a:solidFill>
-                            <a:srgbClr val="000000"/>
-                          </a:solidFill>
-                          <a:effectLst/>
-                          <a:latin typeface="Poppins" panose="00000500000000000000" pitchFamily="2" charset="0"/>
-                          <a:cs typeface="Poppins" panose="00000500000000000000" pitchFamily="2" charset="0"/>
-                        </a:rPr>
-                        <a:t>@davidyadier</a:t>
-                      </a:r>
+                      <a:endParaRPr lang="en-US" sz="1600" b="0" i="0" u="none" strike="noStrike" dirty="0">
+                        <a:solidFill>
+                          <a:srgbClr val="000000"/>
+                        </a:solidFill>
+                        <a:effectLst/>
+                        <a:latin typeface="Poppins" panose="00000500000000000000" pitchFamily="2" charset="0"/>
+                        <a:cs typeface="Poppins" panose="00000500000000000000" pitchFamily="2" charset="0"/>
+                      </a:endParaRPr>
                     </a:p>
                   </a:txBody>
                   <a:tcPr marL="9525" marR="9525" marT="9525" marB="0" anchor="ctr">
@@ -15291,17 +15283,14 @@
                       <a:pPr algn="ctr" fontAlgn="b">
                         <a:buNone/>
                       </a:pPr>
-                      <a:r>
-                        <a:rPr lang="en-US" sz="1600" b="0" i="0" u="none" strike="noStrike">
-                          <a:solidFill>
-                            <a:srgbClr val="000000"/>
-                          </a:solidFill>
-                          <a:effectLst/>
-                          <a:latin typeface="Poppins" panose="00000500000000000000" pitchFamily="2" charset="0"/>
-                          <a:cs typeface="Poppins" panose="00000500000000000000" pitchFamily="2" charset="0"/>
-                        </a:rPr>
-                        <a:t>4</a:t>
-                      </a:r>
+                      <a:endParaRPr lang="en-US" sz="1600" b="0" i="0" u="none" strike="noStrike">
+                        <a:solidFill>
+                          <a:srgbClr val="000000"/>
+                        </a:solidFill>
+                        <a:effectLst/>
+                        <a:latin typeface="Poppins" panose="00000500000000000000" pitchFamily="2" charset="0"/>
+                        <a:cs typeface="Poppins" panose="00000500000000000000" pitchFamily="2" charset="0"/>
+                      </a:endParaRPr>
                     </a:p>
                   </a:txBody>
                   <a:tcPr marL="9525" marR="9525" marT="9525" marB="0" anchor="ctr">
@@ -15318,17 +15307,14 @@
                       <a:pPr algn="ctr" fontAlgn="b">
                         <a:buNone/>
                       </a:pPr>
-                      <a:r>
-                        <a:rPr lang="en-US" sz="1600" b="0" i="0" u="none" strike="noStrike" dirty="0">
-                          <a:solidFill>
-                            <a:srgbClr val="000000"/>
-                          </a:solidFill>
-                          <a:effectLst/>
-                          <a:latin typeface="Poppins" panose="00000500000000000000" pitchFamily="2" charset="0"/>
-                          <a:cs typeface="Poppins" panose="00000500000000000000" pitchFamily="2" charset="0"/>
-                        </a:rPr>
-                        <a:t>422 </a:t>
-                      </a:r>
+                      <a:endParaRPr lang="en-US" sz="1600" b="0" i="0" u="none" strike="noStrike" dirty="0">
+                        <a:solidFill>
+                          <a:srgbClr val="000000"/>
+                        </a:solidFill>
+                        <a:effectLst/>
+                        <a:latin typeface="Poppins" panose="00000500000000000000" pitchFamily="2" charset="0"/>
+                        <a:cs typeface="Poppins" panose="00000500000000000000" pitchFamily="2" charset="0"/>
+                      </a:endParaRPr>
                     </a:p>
                   </a:txBody>
                   <a:tcPr marL="9525" marR="9525" marT="9525" marB="0" anchor="ctr">
@@ -15352,17 +15338,14 @@
                       <a:pPr algn="ctr" fontAlgn="b">
                         <a:buNone/>
                       </a:pPr>
-                      <a:r>
-                        <a:rPr lang="en-US" sz="1600" b="0" i="0" u="none" strike="noStrike">
-                          <a:solidFill>
-                            <a:srgbClr val="000000"/>
-                          </a:solidFill>
-                          <a:effectLst/>
-                          <a:latin typeface="Poppins" panose="00000500000000000000" pitchFamily="2" charset="0"/>
-                          <a:cs typeface="Poppins" panose="00000500000000000000" pitchFamily="2" charset="0"/>
-                        </a:rPr>
-                        <a:t>@arreazaortega</a:t>
-                      </a:r>
+                      <a:endParaRPr lang="en-US" sz="1600" b="0" i="0" u="none" strike="noStrike" dirty="0">
+                        <a:solidFill>
+                          <a:srgbClr val="000000"/>
+                        </a:solidFill>
+                        <a:effectLst/>
+                        <a:latin typeface="Poppins" panose="00000500000000000000" pitchFamily="2" charset="0"/>
+                        <a:cs typeface="Poppins" panose="00000500000000000000" pitchFamily="2" charset="0"/>
+                      </a:endParaRPr>
                     </a:p>
                   </a:txBody>
                   <a:tcPr marL="9525" marR="9525" marT="9525" marB="0" anchor="ctr">
@@ -15379,17 +15362,14 @@
                       <a:pPr algn="ctr" fontAlgn="b">
                         <a:buNone/>
                       </a:pPr>
-                      <a:r>
-                        <a:rPr lang="en-US" sz="1600" b="0" i="0" u="none" strike="noStrike">
-                          <a:solidFill>
-                            <a:srgbClr val="000000"/>
-                          </a:solidFill>
-                          <a:effectLst/>
-                          <a:latin typeface="Poppins" panose="00000500000000000000" pitchFamily="2" charset="0"/>
-                          <a:cs typeface="Poppins" panose="00000500000000000000" pitchFamily="2" charset="0"/>
-                        </a:rPr>
-                        <a:t>4</a:t>
-                      </a:r>
+                      <a:endParaRPr lang="en-US" sz="1600" b="0" i="0" u="none" strike="noStrike">
+                        <a:solidFill>
+                          <a:srgbClr val="000000"/>
+                        </a:solidFill>
+                        <a:effectLst/>
+                        <a:latin typeface="Poppins" panose="00000500000000000000" pitchFamily="2" charset="0"/>
+                        <a:cs typeface="Poppins" panose="00000500000000000000" pitchFamily="2" charset="0"/>
+                      </a:endParaRPr>
                     </a:p>
                   </a:txBody>
                   <a:tcPr marL="9525" marR="9525" marT="9525" marB="0" anchor="ctr">
@@ -15406,17 +15386,14 @@
                       <a:pPr algn="ctr" fontAlgn="b">
                         <a:buNone/>
                       </a:pPr>
-                      <a:r>
-                        <a:rPr lang="en-US" sz="1600" b="0" i="0" u="none" strike="noStrike" dirty="0">
-                          <a:solidFill>
-                            <a:srgbClr val="000000"/>
-                          </a:solidFill>
-                          <a:effectLst/>
-                          <a:latin typeface="Poppins" panose="00000500000000000000" pitchFamily="2" charset="0"/>
-                          <a:cs typeface="Poppins" panose="00000500000000000000" pitchFamily="2" charset="0"/>
-                        </a:rPr>
-                        <a:t>211,055 </a:t>
-                      </a:r>
+                      <a:endParaRPr lang="en-US" sz="1600" b="0" i="0" u="none" strike="noStrike" dirty="0">
+                        <a:solidFill>
+                          <a:srgbClr val="000000"/>
+                        </a:solidFill>
+                        <a:effectLst/>
+                        <a:latin typeface="Poppins" panose="00000500000000000000" pitchFamily="2" charset="0"/>
+                        <a:cs typeface="Poppins" panose="00000500000000000000" pitchFamily="2" charset="0"/>
+                      </a:endParaRPr>
                     </a:p>
                   </a:txBody>
                   <a:tcPr marL="9525" marR="9525" marT="9525" marB="0" anchor="ctr">
@@ -15440,17 +15417,14 @@
                       <a:pPr algn="ctr" fontAlgn="b">
                         <a:buNone/>
                       </a:pPr>
-                      <a:r>
-                        <a:rPr lang="en-US" sz="1600" b="0" i="0" u="none" strike="noStrike">
-                          <a:solidFill>
-                            <a:srgbClr val="000000"/>
-                          </a:solidFill>
-                          <a:effectLst/>
-                          <a:latin typeface="Poppins" panose="00000500000000000000" pitchFamily="2" charset="0"/>
-                          <a:cs typeface="Poppins" panose="00000500000000000000" pitchFamily="2" charset="0"/>
-                        </a:rPr>
-                        <a:t>@ricardogibbon</a:t>
-                      </a:r>
+                      <a:endParaRPr lang="en-US" sz="1600" b="0" i="0" u="none" strike="noStrike">
+                        <a:solidFill>
+                          <a:srgbClr val="000000"/>
+                        </a:solidFill>
+                        <a:effectLst/>
+                        <a:latin typeface="Poppins" panose="00000500000000000000" pitchFamily="2" charset="0"/>
+                        <a:cs typeface="Poppins" panose="00000500000000000000" pitchFamily="2" charset="0"/>
+                      </a:endParaRPr>
                     </a:p>
                   </a:txBody>
                   <a:tcPr marL="9525" marR="9525" marT="9525" marB="0" anchor="ctr">
@@ -15467,17 +15441,14 @@
                       <a:pPr algn="ctr" fontAlgn="b">
                         <a:buNone/>
                       </a:pPr>
-                      <a:r>
-                        <a:rPr lang="en-US" sz="1600" b="0" i="0" u="none" strike="noStrike">
-                          <a:solidFill>
-                            <a:srgbClr val="000000"/>
-                          </a:solidFill>
-                          <a:effectLst/>
-                          <a:latin typeface="Poppins" panose="00000500000000000000" pitchFamily="2" charset="0"/>
-                          <a:cs typeface="Poppins" panose="00000500000000000000" pitchFamily="2" charset="0"/>
-                        </a:rPr>
-                        <a:t>3</a:t>
-                      </a:r>
+                      <a:endParaRPr lang="en-US" sz="1600" b="0" i="0" u="none" strike="noStrike">
+                        <a:solidFill>
+                          <a:srgbClr val="000000"/>
+                        </a:solidFill>
+                        <a:effectLst/>
+                        <a:latin typeface="Poppins" panose="00000500000000000000" pitchFamily="2" charset="0"/>
+                        <a:cs typeface="Poppins" panose="00000500000000000000" pitchFamily="2" charset="0"/>
+                      </a:endParaRPr>
                     </a:p>
                   </a:txBody>
                   <a:tcPr marL="9525" marR="9525" marT="9525" marB="0" anchor="ctr">
@@ -15494,17 +15465,14 @@
                       <a:pPr algn="ctr" fontAlgn="b">
                         <a:buNone/>
                       </a:pPr>
-                      <a:r>
-                        <a:rPr lang="en-US" sz="1600" b="0" i="0" u="none" strike="noStrike" dirty="0">
-                          <a:solidFill>
-                            <a:srgbClr val="000000"/>
-                          </a:solidFill>
-                          <a:effectLst/>
-                          <a:latin typeface="Poppins" panose="00000500000000000000" pitchFamily="2" charset="0"/>
-                          <a:cs typeface="Poppins" panose="00000500000000000000" pitchFamily="2" charset="0"/>
-                        </a:rPr>
-                        <a:t>4,657 </a:t>
-                      </a:r>
+                      <a:endParaRPr lang="en-US" sz="1600" b="0" i="0" u="none" strike="noStrike" dirty="0">
+                        <a:solidFill>
+                          <a:srgbClr val="000000"/>
+                        </a:solidFill>
+                        <a:effectLst/>
+                        <a:latin typeface="Poppins" panose="00000500000000000000" pitchFamily="2" charset="0"/>
+                        <a:cs typeface="Poppins" panose="00000500000000000000" pitchFamily="2" charset="0"/>
+                      </a:endParaRPr>
                     </a:p>
                   </a:txBody>
                   <a:tcPr marL="9525" marR="9525" marT="9525" marB="0" anchor="ctr">
@@ -15528,17 +15496,14 @@
                       <a:pPr algn="ctr" fontAlgn="b">
                         <a:buNone/>
                       </a:pPr>
-                      <a:r>
-                        <a:rPr lang="en-US" sz="1600" b="0" i="0" u="none" strike="noStrike">
-                          <a:solidFill>
-                            <a:srgbClr val="000000"/>
-                          </a:solidFill>
-                          <a:effectLst/>
-                          <a:latin typeface="Poppins" panose="00000500000000000000" pitchFamily="2" charset="0"/>
-                          <a:cs typeface="Poppins" panose="00000500000000000000" pitchFamily="2" charset="0"/>
-                        </a:rPr>
-                        <a:t>@luciaperezrod</a:t>
-                      </a:r>
+                      <a:endParaRPr lang="en-US" sz="1600" b="0" i="0" u="none" strike="noStrike">
+                        <a:solidFill>
+                          <a:srgbClr val="000000"/>
+                        </a:solidFill>
+                        <a:effectLst/>
+                        <a:latin typeface="Poppins" panose="00000500000000000000" pitchFamily="2" charset="0"/>
+                        <a:cs typeface="Poppins" panose="00000500000000000000" pitchFamily="2" charset="0"/>
+                      </a:endParaRPr>
                     </a:p>
                   </a:txBody>
                   <a:tcPr marL="9525" marR="9525" marT="9525" marB="0" anchor="ctr">
@@ -15555,17 +15520,14 @@
                       <a:pPr algn="ctr" fontAlgn="b">
                         <a:buNone/>
                       </a:pPr>
-                      <a:r>
-                        <a:rPr lang="en-US" sz="1600" b="0" i="0" u="none" strike="noStrike">
-                          <a:solidFill>
-                            <a:srgbClr val="000000"/>
-                          </a:solidFill>
-                          <a:effectLst/>
-                          <a:latin typeface="Poppins" panose="00000500000000000000" pitchFamily="2" charset="0"/>
-                          <a:cs typeface="Poppins" panose="00000500000000000000" pitchFamily="2" charset="0"/>
-                        </a:rPr>
-                        <a:t>3</a:t>
-                      </a:r>
+                      <a:endParaRPr lang="en-US" sz="1600" b="0" i="0" u="none" strike="noStrike">
+                        <a:solidFill>
+                          <a:srgbClr val="000000"/>
+                        </a:solidFill>
+                        <a:effectLst/>
+                        <a:latin typeface="Poppins" panose="00000500000000000000" pitchFamily="2" charset="0"/>
+                        <a:cs typeface="Poppins" panose="00000500000000000000" pitchFamily="2" charset="0"/>
+                      </a:endParaRPr>
                     </a:p>
                   </a:txBody>
                   <a:tcPr marL="9525" marR="9525" marT="9525" marB="0" anchor="ctr">
@@ -15582,17 +15544,14 @@
                       <a:pPr algn="ctr" fontAlgn="b">
                         <a:buNone/>
                       </a:pPr>
-                      <a:r>
-                        <a:rPr lang="en-US" sz="1600" b="0" i="0" u="none" strike="noStrike" dirty="0">
-                          <a:solidFill>
-                            <a:srgbClr val="000000"/>
-                          </a:solidFill>
-                          <a:effectLst/>
-                          <a:latin typeface="Poppins" panose="00000500000000000000" pitchFamily="2" charset="0"/>
-                          <a:cs typeface="Poppins" panose="00000500000000000000" pitchFamily="2" charset="0"/>
-                        </a:rPr>
-                        <a:t>779 </a:t>
-                      </a:r>
+                      <a:endParaRPr lang="en-US" sz="1600" b="0" i="0" u="none" strike="noStrike" dirty="0">
+                        <a:solidFill>
+                          <a:srgbClr val="000000"/>
+                        </a:solidFill>
+                        <a:effectLst/>
+                        <a:latin typeface="Poppins" panose="00000500000000000000" pitchFamily="2" charset="0"/>
+                        <a:cs typeface="Poppins" panose="00000500000000000000" pitchFamily="2" charset="0"/>
+                      </a:endParaRPr>
                     </a:p>
                   </a:txBody>
                   <a:tcPr marL="9525" marR="9525" marT="9525" marB="0" anchor="ctr">
@@ -15616,17 +15575,14 @@
                       <a:pPr algn="ctr" fontAlgn="b">
                         <a:buNone/>
                       </a:pPr>
-                      <a:r>
-                        <a:rPr lang="en-US" sz="1600" b="0" i="0" u="none" strike="noStrike">
-                          <a:solidFill>
-                            <a:srgbClr val="000000"/>
-                          </a:solidFill>
-                          <a:effectLst/>
-                          <a:latin typeface="Poppins" panose="00000500000000000000" pitchFamily="2" charset="0"/>
-                          <a:cs typeface="Poppins" panose="00000500000000000000" pitchFamily="2" charset="0"/>
-                        </a:rPr>
-                        <a:t>@melvingutierrez</a:t>
-                      </a:r>
+                      <a:endParaRPr lang="en-US" sz="1600" b="0" i="0" u="none" strike="noStrike">
+                        <a:solidFill>
+                          <a:srgbClr val="000000"/>
+                        </a:solidFill>
+                        <a:effectLst/>
+                        <a:latin typeface="Poppins" panose="00000500000000000000" pitchFamily="2" charset="0"/>
+                        <a:cs typeface="Poppins" panose="00000500000000000000" pitchFamily="2" charset="0"/>
+                      </a:endParaRPr>
                     </a:p>
                   </a:txBody>
                   <a:tcPr marL="9525" marR="9525" marT="9525" marB="0" anchor="ctr">
@@ -15643,17 +15599,14 @@
                       <a:pPr algn="ctr" fontAlgn="b">
                         <a:buNone/>
                       </a:pPr>
-                      <a:r>
-                        <a:rPr lang="en-US" sz="1600" b="0" i="0" u="none" strike="noStrike">
-                          <a:solidFill>
-                            <a:srgbClr val="000000"/>
-                          </a:solidFill>
-                          <a:effectLst/>
-                          <a:latin typeface="Poppins" panose="00000500000000000000" pitchFamily="2" charset="0"/>
-                          <a:cs typeface="Poppins" panose="00000500000000000000" pitchFamily="2" charset="0"/>
-                        </a:rPr>
-                        <a:t>2</a:t>
-                      </a:r>
+                      <a:endParaRPr lang="en-US" sz="1600" b="0" i="0" u="none" strike="noStrike">
+                        <a:solidFill>
+                          <a:srgbClr val="000000"/>
+                        </a:solidFill>
+                        <a:effectLst/>
+                        <a:latin typeface="Poppins" panose="00000500000000000000" pitchFamily="2" charset="0"/>
+                        <a:cs typeface="Poppins" panose="00000500000000000000" pitchFamily="2" charset="0"/>
+                      </a:endParaRPr>
                     </a:p>
                   </a:txBody>
                   <a:tcPr marL="9525" marR="9525" marT="9525" marB="0" anchor="ctr">
@@ -15670,17 +15623,14 @@
                       <a:pPr algn="ctr" fontAlgn="b">
                         <a:buNone/>
                       </a:pPr>
-                      <a:r>
-                        <a:rPr lang="en-US" sz="1600" b="0" i="0" u="none" strike="noStrike" dirty="0">
-                          <a:solidFill>
-                            <a:srgbClr val="000000"/>
-                          </a:solidFill>
-                          <a:effectLst/>
-                          <a:latin typeface="Poppins" panose="00000500000000000000" pitchFamily="2" charset="0"/>
-                          <a:cs typeface="Poppins" panose="00000500000000000000" pitchFamily="2" charset="0"/>
-                        </a:rPr>
-                        <a:t>2,383 </a:t>
-                      </a:r>
+                      <a:endParaRPr lang="en-US" sz="1600" b="0" i="0" u="none" strike="noStrike" dirty="0">
+                        <a:solidFill>
+                          <a:srgbClr val="000000"/>
+                        </a:solidFill>
+                        <a:effectLst/>
+                        <a:latin typeface="Poppins" panose="00000500000000000000" pitchFamily="2" charset="0"/>
+                        <a:cs typeface="Poppins" panose="00000500000000000000" pitchFamily="2" charset="0"/>
+                      </a:endParaRPr>
                     </a:p>
                   </a:txBody>
                   <a:tcPr marL="9525" marR="9525" marT="9525" marB="0" anchor="ctr">
@@ -15749,6 +15699,54 @@
               <a:latin typeface="Effra" panose="020B0603020203020204" pitchFamily="34" charset="0"/>
               <a:ea typeface="Open Sans" panose="020B0606030504020204" pitchFamily="34" charset="0"/>
               <a:cs typeface="Open Sans" panose="020B0606030504020204" pitchFamily="34" charset="0"/>
+            </a:endParaRPr>
+          </a:p>
+        </p:txBody>
+      </p:sp>
+      <p:sp>
+        <p:nvSpPr>
+          <p:cNvPr id="3" name="TextBox 2">
+            <a:extLst>
+              <a:ext uri="{FF2B5EF4-FFF2-40B4-BE49-F238E27FC236}">
+                <a16:creationId xmlns:a16="http://schemas.microsoft.com/office/drawing/2014/main" id="{BEF1A5F5-9A64-72AA-4AF9-F1678568F3CC}"/>
+              </a:ext>
+            </a:extLst>
+          </p:cNvPr>
+          <p:cNvSpPr txBox="1"/>
+          <p:nvPr/>
+        </p:nvSpPr>
+        <p:spPr>
+          <a:xfrm>
+            <a:off x="583096" y="3027462"/>
+            <a:ext cx="9043859" cy="584775"/>
+          </a:xfrm>
+          <a:prstGeom prst="rect">
+            <a:avLst/>
+          </a:prstGeom>
+          <a:noFill/>
+        </p:spPr>
+        <p:txBody>
+          <a:bodyPr wrap="square">
+            <a:spAutoFit/>
+          </a:bodyPr>
+          <a:lstStyle/>
+          <a:p>
+            <a:r>
+              <a:rPr lang="en-US" sz="3200" b="1" dirty="0">
+                <a:solidFill>
+                  <a:schemeClr val="bg1"/>
+                </a:solidFill>
+                <a:latin typeface="Effra" panose="020B0603020203020204" pitchFamily="34" charset="0"/>
+                <a:ea typeface="Open Sans" panose="020B0606030504020204" pitchFamily="34" charset="0"/>
+                <a:cs typeface="Open Sans" panose="020B0606030504020204" pitchFamily="34" charset="0"/>
+              </a:rPr>
+              <a:t>SENTIMENT_PIE</a:t>
+            </a:r>
+            <a:endParaRPr lang="en-US" sz="3200" dirty="0">
+              <a:solidFill>
+                <a:schemeClr val="bg1"/>
+              </a:solidFill>
+              <a:latin typeface="Effra" panose="020B0603020203020204" pitchFamily="34" charset="0"/>
             </a:endParaRPr>
           </a:p>
         </p:txBody>
@@ -16200,6 +16198,45 @@
           </a:p>
         </p:txBody>
       </p:sp>
+      <p:sp>
+        <p:nvSpPr>
+          <p:cNvPr id="7" name="TextBox 6">
+            <a:extLst>
+              <a:ext uri="{FF2B5EF4-FFF2-40B4-BE49-F238E27FC236}">
+                <a16:creationId xmlns:a16="http://schemas.microsoft.com/office/drawing/2014/main" id="{A5EC306D-E36E-AE8E-C925-14E31558A792}"/>
+              </a:ext>
+            </a:extLst>
+          </p:cNvPr>
+          <p:cNvSpPr txBox="1"/>
+          <p:nvPr/>
+        </p:nvSpPr>
+        <p:spPr>
+          <a:xfrm>
+            <a:off x="3894175" y="4489175"/>
+            <a:ext cx="11337740" cy="400110"/>
+          </a:xfrm>
+          <a:prstGeom prst="rect">
+            <a:avLst/>
+          </a:prstGeom>
+          <a:noFill/>
+        </p:spPr>
+        <p:txBody>
+          <a:bodyPr wrap="square">
+            <a:spAutoFit/>
+          </a:bodyPr>
+          <a:lstStyle/>
+          <a:p>
+            <a:pPr algn="just"/>
+            <a:r>
+              <a:rPr lang="es-ES" sz="2000" dirty="0">
+                <a:latin typeface="Poppins" panose="00000500000000000000" pitchFamily="2" charset="0"/>
+                <a:cs typeface="Poppins" panose="00000500000000000000" pitchFamily="2" charset="0"/>
+              </a:rPr>
+              <a:t>TOP_INFLUENCERS_PRENSA_TABLE</a:t>
+            </a:r>
+          </a:p>
+        </p:txBody>
+      </p:sp>
     </p:spTree>
     <p:extLst>
       <p:ext uri="{BB962C8B-B14F-4D97-AF65-F5344CB8AC3E}">
@@ -16598,6 +16635,84 @@
           </a:p>
         </p:txBody>
       </p:sp>
+      <p:sp>
+        <p:nvSpPr>
+          <p:cNvPr id="8" name="TextBox 7">
+            <a:extLst>
+              <a:ext uri="{FF2B5EF4-FFF2-40B4-BE49-F238E27FC236}">
+                <a16:creationId xmlns:a16="http://schemas.microsoft.com/office/drawing/2014/main" id="{C4D2F96C-52C6-0870-C0A1-1652C96FC917}"/>
+              </a:ext>
+            </a:extLst>
+          </p:cNvPr>
+          <p:cNvSpPr txBox="1"/>
+          <p:nvPr/>
+        </p:nvSpPr>
+        <p:spPr>
+          <a:xfrm>
+            <a:off x="3724841" y="4726253"/>
+            <a:ext cx="6999517" cy="400110"/>
+          </a:xfrm>
+          <a:prstGeom prst="rect">
+            <a:avLst/>
+          </a:prstGeom>
+          <a:noFill/>
+        </p:spPr>
+        <p:txBody>
+          <a:bodyPr wrap="square">
+            <a:spAutoFit/>
+          </a:bodyPr>
+          <a:lstStyle/>
+          <a:p>
+            <a:pPr algn="just"/>
+            <a:r>
+              <a:rPr lang="en-US" sz="2000" dirty="0">
+                <a:latin typeface="Poppins" panose="00000500000000000000" pitchFamily="2" charset="0"/>
+                <a:cs typeface="Poppins" panose="00000500000000000000" pitchFamily="2" charset="0"/>
+              </a:rPr>
+              <a:t>TOP_INFLUENCERS_REDES_POSTS_TABLE</a:t>
+            </a:r>
+            <a:endParaRPr lang="es-ES" sz="2000" dirty="0">
+              <a:latin typeface="Poppins" panose="00000500000000000000" pitchFamily="2" charset="0"/>
+              <a:cs typeface="Poppins" panose="00000500000000000000" pitchFamily="2" charset="0"/>
+            </a:endParaRPr>
+          </a:p>
+        </p:txBody>
+      </p:sp>
+      <p:sp>
+        <p:nvSpPr>
+          <p:cNvPr id="14" name="TextBox 13">
+            <a:extLst>
+              <a:ext uri="{FF2B5EF4-FFF2-40B4-BE49-F238E27FC236}">
+                <a16:creationId xmlns:a16="http://schemas.microsoft.com/office/drawing/2014/main" id="{EE02B075-F4BA-3FE7-A1BA-BE849DEC6314}"/>
+              </a:ext>
+            </a:extLst>
+          </p:cNvPr>
+          <p:cNvSpPr txBox="1"/>
+          <p:nvPr/>
+        </p:nvSpPr>
+        <p:spPr>
+          <a:xfrm>
+            <a:off x="13399822" y="4556976"/>
+            <a:ext cx="6999517" cy="369332"/>
+          </a:xfrm>
+          <a:prstGeom prst="rect">
+            <a:avLst/>
+          </a:prstGeom>
+          <a:noFill/>
+        </p:spPr>
+        <p:txBody>
+          <a:bodyPr wrap="square">
+            <a:spAutoFit/>
+          </a:bodyPr>
+          <a:lstStyle/>
+          <a:p>
+            <a:r>
+              <a:rPr lang="en-US" dirty="0"/>
+              <a:t>TOP_INFLUENCERS_REDES_REACH_TABLE</a:t>
+            </a:r>
+          </a:p>
+        </p:txBody>
+      </p:sp>
     </p:spTree>
     <p:extLst>
       <p:ext uri="{BB962C8B-B14F-4D97-AF65-F5344CB8AC3E}">
@@ -16856,6 +16971,48 @@
               <a:rPr lang="en-US" b="1" dirty="0"/>
               <a:t>WORDCLOUD</a:t>
             </a:r>
+          </a:p>
+        </p:txBody>
+      </p:sp>
+      <p:sp>
+        <p:nvSpPr>
+          <p:cNvPr id="4" name="TextBox 3">
+            <a:extLst>
+              <a:ext uri="{FF2B5EF4-FFF2-40B4-BE49-F238E27FC236}">
+                <a16:creationId xmlns:a16="http://schemas.microsoft.com/office/drawing/2014/main" id="{A0290FB6-29CB-6295-7F14-8496CF8CE46F}"/>
+              </a:ext>
+            </a:extLst>
+          </p:cNvPr>
+          <p:cNvSpPr txBox="1"/>
+          <p:nvPr/>
+        </p:nvSpPr>
+        <p:spPr>
+          <a:xfrm>
+            <a:off x="6601258" y="6089650"/>
+            <a:ext cx="9043859" cy="584775"/>
+          </a:xfrm>
+          <a:prstGeom prst="rect">
+            <a:avLst/>
+          </a:prstGeom>
+          <a:noFill/>
+        </p:spPr>
+        <p:txBody>
+          <a:bodyPr wrap="square">
+            <a:spAutoFit/>
+          </a:bodyPr>
+          <a:lstStyle/>
+          <a:p>
+            <a:r>
+              <a:rPr lang="en-US" sz="3200" b="1" dirty="0">
+                <a:latin typeface="Effra" panose="020B0603020203020204" pitchFamily="34" charset="0"/>
+                <a:ea typeface="Open Sans" panose="020B0606030504020204" pitchFamily="34" charset="0"/>
+                <a:cs typeface="Open Sans" panose="020B0606030504020204" pitchFamily="34" charset="0"/>
+              </a:rPr>
+              <a:t>WORDCLOUD</a:t>
+            </a:r>
+            <a:endParaRPr lang="en-US" sz="3200" dirty="0">
+              <a:latin typeface="Effra" panose="020B0603020203020204" pitchFamily="34" charset="0"/>
+            </a:endParaRPr>
           </a:p>
         </p:txBody>
       </p:sp>

</xml_diff>

<commit_message>
Add new PowerPoint template and images; update user database
</commit_message>
<xml_diff>
--- a/powerpoints/Reporte_plantilla_Altice.pptx
+++ b/powerpoints/Reporte_plantilla_Altice.pptx
@@ -9,13 +9,13 @@
   </p:notesMasterIdLst>
   <p:sldIdLst>
     <p:sldId id="257" r:id="rId2"/>
-    <p:sldId id="2147379896" r:id="rId3"/>
-    <p:sldId id="2147379899" r:id="rId4"/>
-    <p:sldId id="2147379897" r:id="rId5"/>
-    <p:sldId id="2147380666" r:id="rId6"/>
-    <p:sldId id="2147380669" r:id="rId7"/>
-    <p:sldId id="2147379898" r:id="rId8"/>
-    <p:sldId id="289" r:id="rId9"/>
+    <p:sldId id="289" r:id="rId3"/>
+    <p:sldId id="2147379896" r:id="rId4"/>
+    <p:sldId id="2147379899" r:id="rId5"/>
+    <p:sldId id="2147379897" r:id="rId6"/>
+    <p:sldId id="2147380666" r:id="rId7"/>
+    <p:sldId id="2147380669" r:id="rId8"/>
+    <p:sldId id="2147379898" r:id="rId9"/>
     <p:sldId id="278" r:id="rId10"/>
   </p:sldIdLst>
   <p:sldSz cx="21651913" cy="12179300"/>
@@ -561,7 +561,7 @@
           <a:p>
             <a:fld id="{DAC07C26-EBFD-4D69-A6A9-EA7197DC0B45}" type="slidenum">
               <a:rPr lang="en-US" smtClean="0"/>
-              <a:t>2</a:t>
+              <a:t>3</a:t>
             </a:fld>
             <a:endParaRPr lang="en-US"/>
           </a:p>
@@ -675,7 +675,7 @@
               <a:pPr>
                 <a:defRPr/>
               </a:pPr>
-              <a:t>5</a:t>
+              <a:t>6</a:t>
             </a:fld>
             <a:endParaRPr lang="en-US" altLang="en-US"/>
           </a:p>
@@ -789,7 +789,7 @@
               <a:pPr>
                 <a:defRPr/>
               </a:pPr>
-              <a:t>6</a:t>
+              <a:t>7</a:t>
             </a:fld>
             <a:endParaRPr lang="en-US" altLang="en-US"/>
           </a:p>
@@ -13260,52 +13260,6 @@
           </a:p>
         </p:txBody>
       </p:sp>
-      <p:sp>
-        <p:nvSpPr>
-          <p:cNvPr id="2" name="Rectangle 9">
-            <a:extLst>
-              <a:ext uri="{FF2B5EF4-FFF2-40B4-BE49-F238E27FC236}">
-                <a16:creationId xmlns:a16="http://schemas.microsoft.com/office/drawing/2014/main" id="{4989BED8-5926-000F-C7E5-C8F0C2000668}"/>
-              </a:ext>
-            </a:extLst>
-          </p:cNvPr>
-          <p:cNvSpPr/>
-          <p:nvPr/>
-        </p:nvSpPr>
-        <p:spPr>
-          <a:xfrm>
-            <a:off x="2038005" y="7475174"/>
-            <a:ext cx="3536886" cy="819360"/>
-          </a:xfrm>
-          <a:prstGeom prst="rect">
-            <a:avLst/>
-          </a:prstGeom>
-          <a:solidFill>
-            <a:schemeClr val="bg1"/>
-          </a:solidFill>
-          <a:ln cap="flat">
-            <a:noFill/>
-            <a:prstDash val="solid"/>
-          </a:ln>
-        </p:spPr>
-        <p:txBody>
-          <a:bodyPr vert="horz" wrap="square" lIns="107460" tIns="53730" rIns="107460" bIns="53730" anchor="ctr" anchorCtr="1" compatLnSpc="1">
-            <a:noAutofit/>
-          </a:bodyPr>
-          <a:lstStyle/>
-          <a:p>
-            <a:r>
-              <a:rPr lang="es-MX" sz="2400" b="1" dirty="0">
-                <a:latin typeface="Effra Light" panose="020B0306080202020204" pitchFamily="34" charset="77"/>
-              </a:rPr>
-              <a:t>REPORT_CLIENT</a:t>
-            </a:r>
-            <a:endParaRPr lang="en-AR" sz="2400" b="1" dirty="0">
-              <a:latin typeface="Effra Light" panose="020B0306080202020204" pitchFamily="34" charset="77"/>
-            </a:endParaRPr>
-          </a:p>
-        </p:txBody>
-      </p:sp>
     </p:spTree>
   </p:cSld>
   <p:clrMapOvr>
@@ -13327,6 +13281,194 @@
 </file>
 
 <file path=ppt/slides/slide2.xml><?xml version="1.0" encoding="utf-8"?>
+<p:sld xmlns:a="http://schemas.openxmlformats.org/drawingml/2006/main" xmlns:r="http://schemas.openxmlformats.org/officeDocument/2006/relationships" xmlns:p="http://schemas.openxmlformats.org/presentationml/2006/main">
+  <p:cSld>
+    <p:spTree>
+      <p:nvGrpSpPr>
+        <p:cNvPr id="1" name=""/>
+        <p:cNvGrpSpPr/>
+        <p:nvPr/>
+      </p:nvGrpSpPr>
+      <p:grpSpPr>
+        <a:xfrm>
+          <a:off x="0" y="0"/>
+          <a:ext cx="0" cy="0"/>
+          <a:chOff x="0" y="0"/>
+          <a:chExt cx="0" cy="0"/>
+        </a:xfrm>
+      </p:grpSpPr>
+      <p:sp>
+        <p:nvSpPr>
+          <p:cNvPr id="5" name="TextBox 4">
+            <a:extLst>
+              <a:ext uri="{FF2B5EF4-FFF2-40B4-BE49-F238E27FC236}">
+                <a16:creationId xmlns:a16="http://schemas.microsoft.com/office/drawing/2014/main" id="{1C62E56B-1A0F-47F0-D032-5EA4506AE63C}"/>
+              </a:ext>
+            </a:extLst>
+          </p:cNvPr>
+          <p:cNvSpPr txBox="1"/>
+          <p:nvPr/>
+        </p:nvSpPr>
+        <p:spPr>
+          <a:xfrm>
+            <a:off x="5157086" y="7436859"/>
+            <a:ext cx="11337740" cy="1015663"/>
+          </a:xfrm>
+          <a:prstGeom prst="rect">
+            <a:avLst/>
+          </a:prstGeom>
+          <a:noFill/>
+        </p:spPr>
+        <p:txBody>
+          <a:bodyPr wrap="square">
+            <a:spAutoFit/>
+          </a:bodyPr>
+          <a:lstStyle/>
+          <a:p>
+            <a:pPr algn="ctr"/>
+            <a:r>
+              <a:rPr lang="en-US" sz="6000" b="1">
+                <a:solidFill>
+                  <a:schemeClr val="bg1"/>
+                </a:solidFill>
+                <a:latin typeface="Effra" panose="020B0603020203020204" pitchFamily="34" charset="0"/>
+                <a:ea typeface="Open Sans" panose="020B0606030504020204" pitchFamily="34" charset="0"/>
+                <a:cs typeface="Open Sans" panose="020B0606030504020204" pitchFamily="34" charset="0"/>
+              </a:rPr>
+              <a:t>R</a:t>
+            </a:r>
+            <a:r>
+              <a:rPr lang="es-DO" sz="6000" b="1">
+                <a:solidFill>
+                  <a:schemeClr val="bg1"/>
+                </a:solidFill>
+                <a:latin typeface="Effra" panose="020B0603020203020204" pitchFamily="34" charset="0"/>
+                <a:ea typeface="Open Sans" panose="020B0606030504020204" pitchFamily="34" charset="0"/>
+                <a:cs typeface="Open Sans" panose="020B0606030504020204" pitchFamily="34" charset="0"/>
+              </a:rPr>
+              <a:t>EPORTE SOCIAL LISTENING</a:t>
+            </a:r>
+          </a:p>
+        </p:txBody>
+      </p:sp>
+      <p:sp>
+        <p:nvSpPr>
+          <p:cNvPr id="2" name="TextBox 1">
+            <a:extLst>
+              <a:ext uri="{FF2B5EF4-FFF2-40B4-BE49-F238E27FC236}">
+                <a16:creationId xmlns:a16="http://schemas.microsoft.com/office/drawing/2014/main" id="{FAC78B06-F4A9-E9E5-241F-38DF3CFE00F0}"/>
+              </a:ext>
+            </a:extLst>
+          </p:cNvPr>
+          <p:cNvSpPr txBox="1"/>
+          <p:nvPr/>
+        </p:nvSpPr>
+        <p:spPr>
+          <a:xfrm>
+            <a:off x="5157086" y="8452522"/>
+            <a:ext cx="11337740" cy="769441"/>
+          </a:xfrm>
+          <a:prstGeom prst="rect">
+            <a:avLst/>
+          </a:prstGeom>
+          <a:solidFill>
+            <a:srgbClr val="E9EBF5"/>
+          </a:solidFill>
+        </p:spPr>
+        <p:txBody>
+          <a:bodyPr wrap="square">
+            <a:spAutoFit/>
+          </a:bodyPr>
+          <a:lstStyle/>
+          <a:p>
+            <a:pPr algn="ctr"/>
+            <a:r>
+              <a:rPr lang="es-DO" sz="4400" b="1">
+                <a:solidFill>
+                  <a:srgbClr val="1855B0"/>
+                </a:solidFill>
+                <a:latin typeface="Effra" panose="020B0603020203020204" pitchFamily="34" charset="0"/>
+                <a:ea typeface="Open Sans" panose="020B0606030504020204" pitchFamily="34" charset="0"/>
+                <a:cs typeface="Open Sans" panose="020B0606030504020204" pitchFamily="34" charset="0"/>
+              </a:rPr>
+              <a:t>TEMA: ALTICE DOMINICANA</a:t>
+            </a:r>
+          </a:p>
+        </p:txBody>
+      </p:sp>
+      <p:pic>
+        <p:nvPicPr>
+          <p:cNvPr id="1026" name="Picture 2">
+            <a:extLst>
+              <a:ext uri="{FF2B5EF4-FFF2-40B4-BE49-F238E27FC236}">
+                <a16:creationId xmlns:a16="http://schemas.microsoft.com/office/drawing/2014/main" id="{88BB6A62-6264-3BFE-BFA5-F1C4D941C868}"/>
+              </a:ext>
+            </a:extLst>
+          </p:cNvPr>
+          <p:cNvPicPr>
+            <a:picLocks noChangeAspect="1" noChangeArrowheads="1"/>
+          </p:cNvPicPr>
+          <p:nvPr/>
+        </p:nvPicPr>
+        <p:blipFill>
+          <a:blip r:embed="rId2">
+            <a:extLst>
+              <a:ext uri="{28A0092B-C50C-407E-A947-70E740481C1C}">
+                <a14:useLocalDpi xmlns:a14="http://schemas.microsoft.com/office/drawing/2010/main" val="0"/>
+              </a:ext>
+            </a:extLst>
+          </a:blip>
+          <a:srcRect/>
+          <a:stretch>
+            <a:fillRect/>
+          </a:stretch>
+        </p:blipFill>
+        <p:spPr bwMode="auto">
+          <a:xfrm>
+            <a:off x="6589468" y="2168151"/>
+            <a:ext cx="8472976" cy="4766049"/>
+          </a:xfrm>
+          <a:prstGeom prst="snipRoundRect">
+            <a:avLst/>
+          </a:prstGeom>
+          <a:noFill/>
+          <a:extLst>
+            <a:ext uri="{909E8E84-426E-40DD-AFC4-6F175D3DCCD1}">
+              <a14:hiddenFill xmlns:a14="http://schemas.microsoft.com/office/drawing/2010/main">
+                <a:solidFill>
+                  <a:srgbClr val="FFFFFF"/>
+                </a:solidFill>
+              </a14:hiddenFill>
+            </a:ext>
+          </a:extLst>
+        </p:spPr>
+      </p:pic>
+    </p:spTree>
+    <p:extLst>
+      <p:ext uri="{BB962C8B-B14F-4D97-AF65-F5344CB8AC3E}">
+        <p14:creationId xmlns:p14="http://schemas.microsoft.com/office/powerpoint/2010/main" val="3788354637"/>
+      </p:ext>
+    </p:extLst>
+  </p:cSld>
+  <p:clrMapOvr>
+    <a:masterClrMapping/>
+  </p:clrMapOvr>
+  <mc:AlternateContent xmlns:mc="http://schemas.openxmlformats.org/markup-compatibility/2006" xmlns:p14="http://schemas.microsoft.com/office/powerpoint/2010/main">
+    <mc:Choice Requires="p14">
+      <p:transition spd="med" p14:dur="700">
+        <p:fade/>
+      </p:transition>
+    </mc:Choice>
+    <mc:Fallback xmlns="">
+      <p:transition spd="med">
+        <p:fade/>
+      </p:transition>
+    </mc:Fallback>
+  </mc:AlternateContent>
+</p:sld>
+</file>
+
+<file path=ppt/slides/slide3.xml><?xml version="1.0" encoding="utf-8"?>
 <p:sld xmlns:a="http://schemas.openxmlformats.org/drawingml/2006/main" xmlns:r="http://schemas.openxmlformats.org/officeDocument/2006/relationships" xmlns:p="http://schemas.openxmlformats.org/presentationml/2006/main">
   <p:cSld>
     <p:spTree>
@@ -13889,7 +14031,7 @@
         <p:spPr>
           <a:xfrm>
             <a:off x="3588406" y="4319935"/>
-            <a:ext cx="9043859" cy="584775"/>
+            <a:ext cx="13361861" cy="584775"/>
           </a:xfrm>
           <a:prstGeom prst="rect">
             <a:avLst/>
@@ -13947,7 +14089,7 @@
 </p:sld>
 </file>
 
-<file path=ppt/slides/slide3.xml><?xml version="1.0" encoding="utf-8"?>
+<file path=ppt/slides/slide4.xml><?xml version="1.0" encoding="utf-8"?>
 <p:sld xmlns:a="http://schemas.openxmlformats.org/drawingml/2006/main" xmlns:r="http://schemas.openxmlformats.org/officeDocument/2006/relationships" xmlns:p="http://schemas.openxmlformats.org/presentationml/2006/main">
   <p:cSld>
     <p:spTree>
@@ -14126,7 +14268,7 @@
 </p:sld>
 </file>
 
-<file path=ppt/slides/slide4.xml><?xml version="1.0" encoding="utf-8"?>
+<file path=ppt/slides/slide5.xml><?xml version="1.0" encoding="utf-8"?>
 <p:sld xmlns:a="http://schemas.openxmlformats.org/drawingml/2006/main" xmlns:r="http://schemas.openxmlformats.org/officeDocument/2006/relationships" xmlns:p="http://schemas.openxmlformats.org/presentationml/2006/main">
   <p:cSld>
     <p:spTree>
@@ -15776,7 +15918,7 @@
 </p:sld>
 </file>
 
-<file path=ppt/slides/slide5.xml><?xml version="1.0" encoding="utf-8"?>
+<file path=ppt/slides/slide6.xml><?xml version="1.0" encoding="utf-8"?>
 <p:sld xmlns:a="http://schemas.openxmlformats.org/drawingml/2006/main" xmlns:r="http://schemas.openxmlformats.org/officeDocument/2006/relationships" xmlns:p="http://schemas.openxmlformats.org/presentationml/2006/main">
   <p:cSld>
     <p:spTree>
@@ -16250,7 +16392,7 @@
 </p:sld>
 </file>
 
-<file path=ppt/slides/slide6.xml><?xml version="1.0" encoding="utf-8"?>
+<file path=ppt/slides/slide7.xml><?xml version="1.0" encoding="utf-8"?>
 <p:sld xmlns:a="http://schemas.openxmlformats.org/drawingml/2006/main" xmlns:r="http://schemas.openxmlformats.org/officeDocument/2006/relationships" xmlns:p="http://schemas.openxmlformats.org/presentationml/2006/main">
   <p:cSld>
     <p:spTree>
@@ -16726,7 +16868,7 @@
 </p:sld>
 </file>
 
-<file path=ppt/slides/slide7.xml><?xml version="1.0" encoding="utf-8"?>
+<file path=ppt/slides/slide8.xml><?xml version="1.0" encoding="utf-8"?>
 <p:sld xmlns:a="http://schemas.openxmlformats.org/drawingml/2006/main" xmlns:r="http://schemas.openxmlformats.org/officeDocument/2006/relationships" xmlns:p="http://schemas.openxmlformats.org/presentationml/2006/main">
   <p:cSld>
     <p:spTree>
@@ -17020,194 +17162,6 @@
     <p:extLst>
       <p:ext uri="{BB962C8B-B14F-4D97-AF65-F5344CB8AC3E}">
         <p14:creationId xmlns:p14="http://schemas.microsoft.com/office/powerpoint/2010/main" val="356908854"/>
-      </p:ext>
-    </p:extLst>
-  </p:cSld>
-  <p:clrMapOvr>
-    <a:masterClrMapping/>
-  </p:clrMapOvr>
-  <mc:AlternateContent xmlns:mc="http://schemas.openxmlformats.org/markup-compatibility/2006" xmlns:p14="http://schemas.microsoft.com/office/powerpoint/2010/main">
-    <mc:Choice Requires="p14">
-      <p:transition spd="med" p14:dur="700">
-        <p:fade/>
-      </p:transition>
-    </mc:Choice>
-    <mc:Fallback xmlns="">
-      <p:transition spd="med">
-        <p:fade/>
-      </p:transition>
-    </mc:Fallback>
-  </mc:AlternateContent>
-</p:sld>
-</file>
-
-<file path=ppt/slides/slide8.xml><?xml version="1.0" encoding="utf-8"?>
-<p:sld xmlns:a="http://schemas.openxmlformats.org/drawingml/2006/main" xmlns:r="http://schemas.openxmlformats.org/officeDocument/2006/relationships" xmlns:p="http://schemas.openxmlformats.org/presentationml/2006/main">
-  <p:cSld>
-    <p:spTree>
-      <p:nvGrpSpPr>
-        <p:cNvPr id="1" name=""/>
-        <p:cNvGrpSpPr/>
-        <p:nvPr/>
-      </p:nvGrpSpPr>
-      <p:grpSpPr>
-        <a:xfrm>
-          <a:off x="0" y="0"/>
-          <a:ext cx="0" cy="0"/>
-          <a:chOff x="0" y="0"/>
-          <a:chExt cx="0" cy="0"/>
-        </a:xfrm>
-      </p:grpSpPr>
-      <p:sp>
-        <p:nvSpPr>
-          <p:cNvPr id="5" name="TextBox 4">
-            <a:extLst>
-              <a:ext uri="{FF2B5EF4-FFF2-40B4-BE49-F238E27FC236}">
-                <a16:creationId xmlns:a16="http://schemas.microsoft.com/office/drawing/2014/main" id="{1C62E56B-1A0F-47F0-D032-5EA4506AE63C}"/>
-              </a:ext>
-            </a:extLst>
-          </p:cNvPr>
-          <p:cNvSpPr txBox="1"/>
-          <p:nvPr/>
-        </p:nvSpPr>
-        <p:spPr>
-          <a:xfrm>
-            <a:off x="5157086" y="7436859"/>
-            <a:ext cx="11337740" cy="1015663"/>
-          </a:xfrm>
-          <a:prstGeom prst="rect">
-            <a:avLst/>
-          </a:prstGeom>
-          <a:noFill/>
-        </p:spPr>
-        <p:txBody>
-          <a:bodyPr wrap="square">
-            <a:spAutoFit/>
-          </a:bodyPr>
-          <a:lstStyle/>
-          <a:p>
-            <a:pPr algn="ctr"/>
-            <a:r>
-              <a:rPr lang="en-US" sz="6000" b="1">
-                <a:solidFill>
-                  <a:schemeClr val="bg1"/>
-                </a:solidFill>
-                <a:latin typeface="Effra" panose="020B0603020203020204" pitchFamily="34" charset="0"/>
-                <a:ea typeface="Open Sans" panose="020B0606030504020204" pitchFamily="34" charset="0"/>
-                <a:cs typeface="Open Sans" panose="020B0606030504020204" pitchFamily="34" charset="0"/>
-              </a:rPr>
-              <a:t>R</a:t>
-            </a:r>
-            <a:r>
-              <a:rPr lang="es-DO" sz="6000" b="1">
-                <a:solidFill>
-                  <a:schemeClr val="bg1"/>
-                </a:solidFill>
-                <a:latin typeface="Effra" panose="020B0603020203020204" pitchFamily="34" charset="0"/>
-                <a:ea typeface="Open Sans" panose="020B0606030504020204" pitchFamily="34" charset="0"/>
-                <a:cs typeface="Open Sans" panose="020B0606030504020204" pitchFamily="34" charset="0"/>
-              </a:rPr>
-              <a:t>EPORTE SOCIAL LISTENING</a:t>
-            </a:r>
-          </a:p>
-        </p:txBody>
-      </p:sp>
-      <p:sp>
-        <p:nvSpPr>
-          <p:cNvPr id="2" name="TextBox 1">
-            <a:extLst>
-              <a:ext uri="{FF2B5EF4-FFF2-40B4-BE49-F238E27FC236}">
-                <a16:creationId xmlns:a16="http://schemas.microsoft.com/office/drawing/2014/main" id="{FAC78B06-F4A9-E9E5-241F-38DF3CFE00F0}"/>
-              </a:ext>
-            </a:extLst>
-          </p:cNvPr>
-          <p:cNvSpPr txBox="1"/>
-          <p:nvPr/>
-        </p:nvSpPr>
-        <p:spPr>
-          <a:xfrm>
-            <a:off x="5157086" y="8452522"/>
-            <a:ext cx="11337740" cy="769441"/>
-          </a:xfrm>
-          <a:prstGeom prst="rect">
-            <a:avLst/>
-          </a:prstGeom>
-          <a:solidFill>
-            <a:srgbClr val="E9EBF5"/>
-          </a:solidFill>
-        </p:spPr>
-        <p:txBody>
-          <a:bodyPr wrap="square">
-            <a:spAutoFit/>
-          </a:bodyPr>
-          <a:lstStyle/>
-          <a:p>
-            <a:pPr algn="ctr"/>
-            <a:r>
-              <a:rPr lang="es-DO" sz="4400" b="1">
-                <a:solidFill>
-                  <a:srgbClr val="1855B0"/>
-                </a:solidFill>
-                <a:latin typeface="Effra" panose="020B0603020203020204" pitchFamily="34" charset="0"/>
-                <a:ea typeface="Open Sans" panose="020B0606030504020204" pitchFamily="34" charset="0"/>
-                <a:cs typeface="Open Sans" panose="020B0606030504020204" pitchFamily="34" charset="0"/>
-              </a:rPr>
-              <a:t>TEMA: ALTICE DOMINICANA</a:t>
-            </a:r>
-          </a:p>
-        </p:txBody>
-      </p:sp>
-      <p:pic>
-        <p:nvPicPr>
-          <p:cNvPr id="1026" name="Picture 2">
-            <a:extLst>
-              <a:ext uri="{FF2B5EF4-FFF2-40B4-BE49-F238E27FC236}">
-                <a16:creationId xmlns:a16="http://schemas.microsoft.com/office/drawing/2014/main" id="{88BB6A62-6264-3BFE-BFA5-F1C4D941C868}"/>
-              </a:ext>
-            </a:extLst>
-          </p:cNvPr>
-          <p:cNvPicPr>
-            <a:picLocks noChangeAspect="1" noChangeArrowheads="1"/>
-          </p:cNvPicPr>
-          <p:nvPr/>
-        </p:nvPicPr>
-        <p:blipFill>
-          <a:blip r:embed="rId2">
-            <a:extLst>
-              <a:ext uri="{28A0092B-C50C-407E-A947-70E740481C1C}">
-                <a14:useLocalDpi xmlns:a14="http://schemas.microsoft.com/office/drawing/2010/main" val="0"/>
-              </a:ext>
-            </a:extLst>
-          </a:blip>
-          <a:srcRect/>
-          <a:stretch>
-            <a:fillRect/>
-          </a:stretch>
-        </p:blipFill>
-        <p:spPr bwMode="auto">
-          <a:xfrm>
-            <a:off x="6589468" y="2168151"/>
-            <a:ext cx="8472976" cy="4766049"/>
-          </a:xfrm>
-          <a:prstGeom prst="snipRoundRect">
-            <a:avLst/>
-          </a:prstGeom>
-          <a:noFill/>
-          <a:extLst>
-            <a:ext uri="{909E8E84-426E-40DD-AFC4-6F175D3DCCD1}">
-              <a14:hiddenFill xmlns:a14="http://schemas.microsoft.com/office/drawing/2010/main">
-                <a:solidFill>
-                  <a:srgbClr val="FFFFFF"/>
-                </a:solidFill>
-              </a14:hiddenFill>
-            </a:ext>
-          </a:extLst>
-        </p:spPr>
-      </p:pic>
-    </p:spTree>
-    <p:extLst>
-      <p:ext uri="{BB962C8B-B14F-4D97-AF65-F5344CB8AC3E}">
-        <p14:creationId xmlns:p14="http://schemas.microsoft.com/office/powerpoint/2010/main" val="3788354637"/>
       </p:ext>
     </p:extLst>
   </p:cSld>

</xml_diff>